<commit_message>
WIP on review of slides and updating additional topics with step to set up afree online trial.
</commit_message>
<xml_diff>
--- a/Documents/Additional Topics.pptx
+++ b/Documents/Additional Topics.pptx
@@ -1,17 +1,25 @@
 
 <file path=ppt/presentation.xml><?xml version="1.0" encoding="utf-8"?>
-<p:presentation xmlns:a="http://schemas.openxmlformats.org/drawingml/2006/main" xmlns:r="http://schemas.openxmlformats.org/officeDocument/2006/relationships" xmlns:p="http://schemas.openxmlformats.org/presentationml/2006/main" saveSubsetFonts="1">
+<p:presentation xmlns:a="http://schemas.openxmlformats.org/drawingml/2006/main" xmlns:r="http://schemas.openxmlformats.org/officeDocument/2006/relationships" xmlns:p="http://schemas.openxmlformats.org/presentationml/2006/main" showSpecialPlsOnTitleSld="0" saveSubsetFonts="1">
   <p:sldMasterIdLst>
     <p:sldMasterId id="2147483648" r:id="rId1"/>
   </p:sldMasterIdLst>
+  <p:notesMasterIdLst>
+    <p:notesMasterId r:id="rId14"/>
+  </p:notesMasterIdLst>
   <p:sldIdLst>
     <p:sldId id="256" r:id="rId2"/>
-    <p:sldId id="260" r:id="rId3"/>
-    <p:sldId id="257" r:id="rId4"/>
-    <p:sldId id="262" r:id="rId5"/>
-    <p:sldId id="258" r:id="rId6"/>
-    <p:sldId id="259" r:id="rId7"/>
-    <p:sldId id="261" r:id="rId8"/>
+    <p:sldId id="263" r:id="rId3"/>
+    <p:sldId id="264" r:id="rId4"/>
+    <p:sldId id="265" r:id="rId5"/>
+    <p:sldId id="266" r:id="rId6"/>
+    <p:sldId id="267" r:id="rId7"/>
+    <p:sldId id="260" r:id="rId8"/>
+    <p:sldId id="257" r:id="rId9"/>
+    <p:sldId id="262" r:id="rId10"/>
+    <p:sldId id="258" r:id="rId11"/>
+    <p:sldId id="259" r:id="rId12"/>
+    <p:sldId id="261" r:id="rId13"/>
   </p:sldIdLst>
   <p:sldSz cx="12192000" cy="6858000"/>
   <p:notesSz cx="6858000" cy="9144000"/>
@@ -110,7 +118,454 @@
       </a:defRPr>
     </a:lvl9pPr>
   </p:defaultTextStyle>
+  <p:extLst>
+    <p:ext uri="{EFAFB233-063F-42B5-8137-9DF3F51BA10A}">
+      <p15:sldGuideLst xmlns:p15="http://schemas.microsoft.com/office/powerpoint/2012/main"/>
+    </p:ext>
+  </p:extLst>
 </p:presentation>
+</file>
+
+<file path=ppt/notesMasters/notesMaster1.xml><?xml version="1.0" encoding="utf-8"?>
+<p:notesMaster xmlns:a="http://schemas.openxmlformats.org/drawingml/2006/main" xmlns:r="http://schemas.openxmlformats.org/officeDocument/2006/relationships" xmlns:p="http://schemas.openxmlformats.org/presentationml/2006/main">
+  <p:cSld>
+    <p:bg>
+      <p:bgRef idx="1001">
+        <a:schemeClr val="bg1"/>
+      </p:bgRef>
+    </p:bg>
+    <p:spTree>
+      <p:nvGrpSpPr>
+        <p:cNvPr id="1" name=""/>
+        <p:cNvGrpSpPr/>
+        <p:nvPr/>
+      </p:nvGrpSpPr>
+      <p:grpSpPr>
+        <a:xfrm>
+          <a:off x="0" y="0"/>
+          <a:ext cx="0" cy="0"/>
+          <a:chOff x="0" y="0"/>
+          <a:chExt cx="0" cy="0"/>
+        </a:xfrm>
+      </p:grpSpPr>
+      <p:sp>
+        <p:nvSpPr>
+          <p:cNvPr id="2" name="Header Placeholder 1"/>
+          <p:cNvSpPr>
+            <a:spLocks noGrp="1"/>
+          </p:cNvSpPr>
+          <p:nvPr>
+            <p:ph type="hdr" sz="quarter"/>
+          </p:nvPr>
+        </p:nvSpPr>
+        <p:spPr>
+          <a:xfrm>
+            <a:off x="0" y="0"/>
+            <a:ext cx="2971800" cy="458788"/>
+          </a:xfrm>
+          <a:prstGeom prst="rect">
+            <a:avLst/>
+          </a:prstGeom>
+        </p:spPr>
+        <p:txBody>
+          <a:bodyPr vert="horz" lIns="91440" tIns="45720" rIns="91440" bIns="45720" rtlCol="0"/>
+          <a:lstStyle>
+            <a:lvl1pPr algn="l">
+              <a:defRPr sz="1200"/>
+            </a:lvl1pPr>
+          </a:lstStyle>
+          <a:p>
+            <a:endParaRPr lang="en-GB"/>
+          </a:p>
+        </p:txBody>
+      </p:sp>
+      <p:sp>
+        <p:nvSpPr>
+          <p:cNvPr id="3" name="Date Placeholder 2"/>
+          <p:cNvSpPr>
+            <a:spLocks noGrp="1"/>
+          </p:cNvSpPr>
+          <p:nvPr>
+            <p:ph type="dt" idx="1"/>
+          </p:nvPr>
+        </p:nvSpPr>
+        <p:spPr>
+          <a:xfrm>
+            <a:off x="3884613" y="0"/>
+            <a:ext cx="2971800" cy="458788"/>
+          </a:xfrm>
+          <a:prstGeom prst="rect">
+            <a:avLst/>
+          </a:prstGeom>
+        </p:spPr>
+        <p:txBody>
+          <a:bodyPr vert="horz" lIns="91440" tIns="45720" rIns="91440" bIns="45720" rtlCol="0"/>
+          <a:lstStyle>
+            <a:lvl1pPr algn="r">
+              <a:defRPr sz="1200"/>
+            </a:lvl1pPr>
+          </a:lstStyle>
+          <a:p>
+            <a:fld id="{9977D0DD-5151-4202-A3ED-B022C643F49C}" type="datetimeFigureOut">
+              <a:rPr lang="en-GB" smtClean="0"/>
+              <a:t>10/01/2019</a:t>
+            </a:fld>
+            <a:endParaRPr lang="en-GB"/>
+          </a:p>
+        </p:txBody>
+      </p:sp>
+      <p:sp>
+        <p:nvSpPr>
+          <p:cNvPr id="4" name="Slide Image Placeholder 3"/>
+          <p:cNvSpPr>
+            <a:spLocks noGrp="1" noRot="1" noChangeAspect="1"/>
+          </p:cNvSpPr>
+          <p:nvPr>
+            <p:ph type="sldImg" idx="2"/>
+          </p:nvPr>
+        </p:nvSpPr>
+        <p:spPr>
+          <a:xfrm>
+            <a:off x="685800" y="1143000"/>
+            <a:ext cx="5486400" cy="3086100"/>
+          </a:xfrm>
+          <a:prstGeom prst="rect">
+            <a:avLst/>
+          </a:prstGeom>
+          <a:noFill/>
+          <a:ln w="12700">
+            <a:solidFill>
+              <a:prstClr val="black"/>
+            </a:solidFill>
+          </a:ln>
+        </p:spPr>
+        <p:txBody>
+          <a:bodyPr vert="horz" lIns="91440" tIns="45720" rIns="91440" bIns="45720" rtlCol="0" anchor="ctr"/>
+          <a:lstStyle/>
+          <a:p>
+            <a:endParaRPr lang="en-GB"/>
+          </a:p>
+        </p:txBody>
+      </p:sp>
+      <p:sp>
+        <p:nvSpPr>
+          <p:cNvPr id="5" name="Notes Placeholder 4"/>
+          <p:cNvSpPr>
+            <a:spLocks noGrp="1"/>
+          </p:cNvSpPr>
+          <p:nvPr>
+            <p:ph type="body" sz="quarter" idx="3"/>
+          </p:nvPr>
+        </p:nvSpPr>
+        <p:spPr>
+          <a:xfrm>
+            <a:off x="685800" y="4400550"/>
+            <a:ext cx="5486400" cy="3600450"/>
+          </a:xfrm>
+          <a:prstGeom prst="rect">
+            <a:avLst/>
+          </a:prstGeom>
+        </p:spPr>
+        <p:txBody>
+          <a:bodyPr vert="horz" lIns="91440" tIns="45720" rIns="91440" bIns="45720" rtlCol="0"/>
+          <a:lstStyle/>
+          <a:p>
+            <a:pPr lvl="0"/>
+            <a:r>
+              <a:rPr lang="en-US" smtClean="0"/>
+              <a:t>Edit Master text styles</a:t>
+            </a:r>
+          </a:p>
+          <a:p>
+            <a:pPr lvl="1"/>
+            <a:r>
+              <a:rPr lang="en-US" smtClean="0"/>
+              <a:t>Second level</a:t>
+            </a:r>
+          </a:p>
+          <a:p>
+            <a:pPr lvl="2"/>
+            <a:r>
+              <a:rPr lang="en-US" smtClean="0"/>
+              <a:t>Third level</a:t>
+            </a:r>
+          </a:p>
+          <a:p>
+            <a:pPr lvl="3"/>
+            <a:r>
+              <a:rPr lang="en-US" smtClean="0"/>
+              <a:t>Fourth level</a:t>
+            </a:r>
+          </a:p>
+          <a:p>
+            <a:pPr lvl="4"/>
+            <a:r>
+              <a:rPr lang="en-US" smtClean="0"/>
+              <a:t>Fifth level</a:t>
+            </a:r>
+            <a:endParaRPr lang="en-GB"/>
+          </a:p>
+        </p:txBody>
+      </p:sp>
+      <p:sp>
+        <p:nvSpPr>
+          <p:cNvPr id="6" name="Footer Placeholder 5"/>
+          <p:cNvSpPr>
+            <a:spLocks noGrp="1"/>
+          </p:cNvSpPr>
+          <p:nvPr>
+            <p:ph type="ftr" sz="quarter" idx="4"/>
+          </p:nvPr>
+        </p:nvSpPr>
+        <p:spPr>
+          <a:xfrm>
+            <a:off x="0" y="8685213"/>
+            <a:ext cx="2971800" cy="458787"/>
+          </a:xfrm>
+          <a:prstGeom prst="rect">
+            <a:avLst/>
+          </a:prstGeom>
+        </p:spPr>
+        <p:txBody>
+          <a:bodyPr vert="horz" lIns="91440" tIns="45720" rIns="91440" bIns="45720" rtlCol="0" anchor="b"/>
+          <a:lstStyle>
+            <a:lvl1pPr algn="l">
+              <a:defRPr sz="1200"/>
+            </a:lvl1pPr>
+          </a:lstStyle>
+          <a:p>
+            <a:endParaRPr lang="en-GB"/>
+          </a:p>
+        </p:txBody>
+      </p:sp>
+      <p:sp>
+        <p:nvSpPr>
+          <p:cNvPr id="7" name="Slide Number Placeholder 6"/>
+          <p:cNvSpPr>
+            <a:spLocks noGrp="1"/>
+          </p:cNvSpPr>
+          <p:nvPr>
+            <p:ph type="sldNum" sz="quarter" idx="5"/>
+          </p:nvPr>
+        </p:nvSpPr>
+        <p:spPr>
+          <a:xfrm>
+            <a:off x="3884613" y="8685213"/>
+            <a:ext cx="2971800" cy="458787"/>
+          </a:xfrm>
+          <a:prstGeom prst="rect">
+            <a:avLst/>
+          </a:prstGeom>
+        </p:spPr>
+        <p:txBody>
+          <a:bodyPr vert="horz" lIns="91440" tIns="45720" rIns="91440" bIns="45720" rtlCol="0" anchor="b"/>
+          <a:lstStyle>
+            <a:lvl1pPr algn="r">
+              <a:defRPr sz="1200"/>
+            </a:lvl1pPr>
+          </a:lstStyle>
+          <a:p>
+            <a:fld id="{66BB90A2-2E33-4A93-8D25-5EE012A0ADFA}" type="slidenum">
+              <a:rPr lang="en-GB" smtClean="0"/>
+              <a:t>‹#›</a:t>
+            </a:fld>
+            <a:endParaRPr lang="en-GB"/>
+          </a:p>
+        </p:txBody>
+      </p:sp>
+    </p:spTree>
+    <p:extLst>
+      <p:ext uri="{BB962C8B-B14F-4D97-AF65-F5344CB8AC3E}">
+        <p14:creationId xmlns:p14="http://schemas.microsoft.com/office/powerpoint/2010/main" val="778629184"/>
+      </p:ext>
+    </p:extLst>
+  </p:cSld>
+  <p:clrMap bg1="lt1" tx1="dk1" bg2="lt2" tx2="dk2" accent1="accent1" accent2="accent2" accent3="accent3" accent4="accent4" accent5="accent5" accent6="accent6" hlink="hlink" folHlink="folHlink"/>
+  <p:notesStyle>
+    <a:lvl1pPr marL="0" algn="l" defTabSz="914400" rtl="0" eaLnBrk="1" latinLnBrk="0" hangingPunct="1">
+      <a:defRPr sz="1200" kern="1200">
+        <a:solidFill>
+          <a:schemeClr val="tx1"/>
+        </a:solidFill>
+        <a:latin typeface="+mn-lt"/>
+        <a:ea typeface="+mn-ea"/>
+        <a:cs typeface="+mn-cs"/>
+      </a:defRPr>
+    </a:lvl1pPr>
+    <a:lvl2pPr marL="457200" algn="l" defTabSz="914400" rtl="0" eaLnBrk="1" latinLnBrk="0" hangingPunct="1">
+      <a:defRPr sz="1200" kern="1200">
+        <a:solidFill>
+          <a:schemeClr val="tx1"/>
+        </a:solidFill>
+        <a:latin typeface="+mn-lt"/>
+        <a:ea typeface="+mn-ea"/>
+        <a:cs typeface="+mn-cs"/>
+      </a:defRPr>
+    </a:lvl2pPr>
+    <a:lvl3pPr marL="914400" algn="l" defTabSz="914400" rtl="0" eaLnBrk="1" latinLnBrk="0" hangingPunct="1">
+      <a:defRPr sz="1200" kern="1200">
+        <a:solidFill>
+          <a:schemeClr val="tx1"/>
+        </a:solidFill>
+        <a:latin typeface="+mn-lt"/>
+        <a:ea typeface="+mn-ea"/>
+        <a:cs typeface="+mn-cs"/>
+      </a:defRPr>
+    </a:lvl3pPr>
+    <a:lvl4pPr marL="1371600" algn="l" defTabSz="914400" rtl="0" eaLnBrk="1" latinLnBrk="0" hangingPunct="1">
+      <a:defRPr sz="1200" kern="1200">
+        <a:solidFill>
+          <a:schemeClr val="tx1"/>
+        </a:solidFill>
+        <a:latin typeface="+mn-lt"/>
+        <a:ea typeface="+mn-ea"/>
+        <a:cs typeface="+mn-cs"/>
+      </a:defRPr>
+    </a:lvl4pPr>
+    <a:lvl5pPr marL="1828800" algn="l" defTabSz="914400" rtl="0" eaLnBrk="1" latinLnBrk="0" hangingPunct="1">
+      <a:defRPr sz="1200" kern="1200">
+        <a:solidFill>
+          <a:schemeClr val="tx1"/>
+        </a:solidFill>
+        <a:latin typeface="+mn-lt"/>
+        <a:ea typeface="+mn-ea"/>
+        <a:cs typeface="+mn-cs"/>
+      </a:defRPr>
+    </a:lvl5pPr>
+    <a:lvl6pPr marL="2286000" algn="l" defTabSz="914400" rtl="0" eaLnBrk="1" latinLnBrk="0" hangingPunct="1">
+      <a:defRPr sz="1200" kern="1200">
+        <a:solidFill>
+          <a:schemeClr val="tx1"/>
+        </a:solidFill>
+        <a:latin typeface="+mn-lt"/>
+        <a:ea typeface="+mn-ea"/>
+        <a:cs typeface="+mn-cs"/>
+      </a:defRPr>
+    </a:lvl6pPr>
+    <a:lvl7pPr marL="2743200" algn="l" defTabSz="914400" rtl="0" eaLnBrk="1" latinLnBrk="0" hangingPunct="1">
+      <a:defRPr sz="1200" kern="1200">
+        <a:solidFill>
+          <a:schemeClr val="tx1"/>
+        </a:solidFill>
+        <a:latin typeface="+mn-lt"/>
+        <a:ea typeface="+mn-ea"/>
+        <a:cs typeface="+mn-cs"/>
+      </a:defRPr>
+    </a:lvl7pPr>
+    <a:lvl8pPr marL="3200400" algn="l" defTabSz="914400" rtl="0" eaLnBrk="1" latinLnBrk="0" hangingPunct="1">
+      <a:defRPr sz="1200" kern="1200">
+        <a:solidFill>
+          <a:schemeClr val="tx1"/>
+        </a:solidFill>
+        <a:latin typeface="+mn-lt"/>
+        <a:ea typeface="+mn-ea"/>
+        <a:cs typeface="+mn-cs"/>
+      </a:defRPr>
+    </a:lvl8pPr>
+    <a:lvl9pPr marL="3657600" algn="l" defTabSz="914400" rtl="0" eaLnBrk="1" latinLnBrk="0" hangingPunct="1">
+      <a:defRPr sz="1200" kern="1200">
+        <a:solidFill>
+          <a:schemeClr val="tx1"/>
+        </a:solidFill>
+        <a:latin typeface="+mn-lt"/>
+        <a:ea typeface="+mn-ea"/>
+        <a:cs typeface="+mn-cs"/>
+      </a:defRPr>
+    </a:lvl9pPr>
+  </p:notesStyle>
+</p:notesMaster>
+</file>
+
+<file path=ppt/notesSlides/notesSlide1.xml><?xml version="1.0" encoding="utf-8"?>
+<p:notes xmlns:a="http://schemas.openxmlformats.org/drawingml/2006/main" xmlns:r="http://schemas.openxmlformats.org/officeDocument/2006/relationships" xmlns:p="http://schemas.openxmlformats.org/presentationml/2006/main">
+  <p:cSld>
+    <p:spTree>
+      <p:nvGrpSpPr>
+        <p:cNvPr id="1" name=""/>
+        <p:cNvGrpSpPr/>
+        <p:nvPr/>
+      </p:nvGrpSpPr>
+      <p:grpSpPr>
+        <a:xfrm>
+          <a:off x="0" y="0"/>
+          <a:ext cx="0" cy="0"/>
+          <a:chOff x="0" y="0"/>
+          <a:chExt cx="0" cy="0"/>
+        </a:xfrm>
+      </p:grpSpPr>
+      <p:sp>
+        <p:nvSpPr>
+          <p:cNvPr id="2" name="Slide Image Placeholder 1"/>
+          <p:cNvSpPr>
+            <a:spLocks noGrp="1" noRot="1" noChangeAspect="1"/>
+          </p:cNvSpPr>
+          <p:nvPr>
+            <p:ph type="sldImg"/>
+          </p:nvPr>
+        </p:nvSpPr>
+        <p:spPr/>
+      </p:sp>
+      <p:sp>
+        <p:nvSpPr>
+          <p:cNvPr id="3" name="Notes Placeholder 2"/>
+          <p:cNvSpPr>
+            <a:spLocks noGrp="1"/>
+          </p:cNvSpPr>
+          <p:nvPr>
+            <p:ph type="body" idx="1"/>
+          </p:nvPr>
+        </p:nvSpPr>
+        <p:spPr/>
+        <p:txBody>
+          <a:bodyPr/>
+          <a:lstStyle/>
+          <a:p>
+            <a:r>
+              <a:rPr lang="en-GB" dirty="0" smtClean="0"/>
+              <a:t>When creating user ID (especially for training)</a:t>
+            </a:r>
+            <a:r>
+              <a:rPr lang="en-GB" baseline="0" dirty="0" smtClean="0"/>
+              <a:t> use a short and easily remembered user name and company name. You will have to type it in a type it a lot.</a:t>
+            </a:r>
+            <a:endParaRPr lang="en-GB" dirty="0"/>
+          </a:p>
+        </p:txBody>
+      </p:sp>
+      <p:sp>
+        <p:nvSpPr>
+          <p:cNvPr id="4" name="Slide Number Placeholder 3"/>
+          <p:cNvSpPr>
+            <a:spLocks noGrp="1"/>
+          </p:cNvSpPr>
+          <p:nvPr>
+            <p:ph type="sldNum" sz="quarter" idx="10"/>
+          </p:nvPr>
+        </p:nvSpPr>
+        <p:spPr/>
+        <p:txBody>
+          <a:bodyPr/>
+          <a:lstStyle/>
+          <a:p>
+            <a:fld id="{66BB90A2-2E33-4A93-8D25-5EE012A0ADFA}" type="slidenum">
+              <a:rPr lang="en-GB" smtClean="0"/>
+              <a:t>5</a:t>
+            </a:fld>
+            <a:endParaRPr lang="en-GB"/>
+          </a:p>
+        </p:txBody>
+      </p:sp>
+    </p:spTree>
+    <p:extLst>
+      <p:ext uri="{BB962C8B-B14F-4D97-AF65-F5344CB8AC3E}">
+        <p14:creationId xmlns:p14="http://schemas.microsoft.com/office/powerpoint/2010/main" val="561065567"/>
+      </p:ext>
+    </p:extLst>
+  </p:cSld>
+  <p:clrMapOvr>
+    <a:masterClrMapping/>
+  </p:clrMapOvr>
+</p:notes>
 </file>
 
 <file path=ppt/slideLayouts/slideLayout1.xml><?xml version="1.0" encoding="utf-8"?>
@@ -242,9 +697,9 @@
           <a:bodyPr/>
           <a:lstStyle/>
           <a:p>
-            <a:fld id="{18BD90EC-E05E-4499-AEB7-1F606021F0B3}" type="datetimeFigureOut">
+            <a:fld id="{032CFFB0-FC07-4C86-9715-E95635072408}" type="datetime1">
               <a:rPr lang="en-GB" smtClean="0"/>
-              <a:t>13/11/2018</a:t>
+              <a:t>10/01/2019</a:t>
             </a:fld>
             <a:endParaRPr lang="en-GB"/>
           </a:p>
@@ -412,9 +867,9 @@
           <a:bodyPr/>
           <a:lstStyle/>
           <a:p>
-            <a:fld id="{18BD90EC-E05E-4499-AEB7-1F606021F0B3}" type="datetimeFigureOut">
+            <a:fld id="{32A04D66-B9B7-4EB9-B742-A901355FFEA4}" type="datetime1">
               <a:rPr lang="en-GB" smtClean="0"/>
-              <a:t>13/11/2018</a:t>
+              <a:t>10/01/2019</a:t>
             </a:fld>
             <a:endParaRPr lang="en-GB"/>
           </a:p>
@@ -592,9 +1047,9 @@
           <a:bodyPr/>
           <a:lstStyle/>
           <a:p>
-            <a:fld id="{18BD90EC-E05E-4499-AEB7-1F606021F0B3}" type="datetimeFigureOut">
+            <a:fld id="{6CBA81E7-3074-4B77-8927-5225B0F7868C}" type="datetime1">
               <a:rPr lang="en-GB" smtClean="0"/>
-              <a:t>13/11/2018</a:t>
+              <a:t>10/01/2019</a:t>
             </a:fld>
             <a:endParaRPr lang="en-GB"/>
           </a:p>
@@ -762,9 +1217,9 @@
           <a:bodyPr/>
           <a:lstStyle/>
           <a:p>
-            <a:fld id="{18BD90EC-E05E-4499-AEB7-1F606021F0B3}" type="datetimeFigureOut">
+            <a:fld id="{33BDA724-7D31-41F3-BC58-BDC27087454F}" type="datetime1">
               <a:rPr lang="en-GB" smtClean="0"/>
-              <a:t>13/11/2018</a:t>
+              <a:t>10/01/2019</a:t>
             </a:fld>
             <a:endParaRPr lang="en-GB"/>
           </a:p>
@@ -1008,9 +1463,9 @@
           <a:bodyPr/>
           <a:lstStyle/>
           <a:p>
-            <a:fld id="{18BD90EC-E05E-4499-AEB7-1F606021F0B3}" type="datetimeFigureOut">
+            <a:fld id="{68B0FDB6-5C75-4A36-A0B4-F3E8A03368ED}" type="datetime1">
               <a:rPr lang="en-GB" smtClean="0"/>
-              <a:t>13/11/2018</a:t>
+              <a:t>10/01/2019</a:t>
             </a:fld>
             <a:endParaRPr lang="en-GB"/>
           </a:p>
@@ -1240,9 +1695,9 @@
           <a:bodyPr/>
           <a:lstStyle/>
           <a:p>
-            <a:fld id="{18BD90EC-E05E-4499-AEB7-1F606021F0B3}" type="datetimeFigureOut">
+            <a:fld id="{CC9C6CEB-FE45-4CF4-B88E-BA95C63B73D7}" type="datetime1">
               <a:rPr lang="en-GB" smtClean="0"/>
-              <a:t>13/11/2018</a:t>
+              <a:t>10/01/2019</a:t>
             </a:fld>
             <a:endParaRPr lang="en-GB"/>
           </a:p>
@@ -1607,9 +2062,9 @@
           <a:bodyPr/>
           <a:lstStyle/>
           <a:p>
-            <a:fld id="{18BD90EC-E05E-4499-AEB7-1F606021F0B3}" type="datetimeFigureOut">
+            <a:fld id="{19B2D261-B261-4F0A-8BE9-468CA2097679}" type="datetime1">
               <a:rPr lang="en-GB" smtClean="0"/>
-              <a:t>13/11/2018</a:t>
+              <a:t>10/01/2019</a:t>
             </a:fld>
             <a:endParaRPr lang="en-GB"/>
           </a:p>
@@ -1725,9 +2180,9 @@
           <a:bodyPr/>
           <a:lstStyle/>
           <a:p>
-            <a:fld id="{18BD90EC-E05E-4499-AEB7-1F606021F0B3}" type="datetimeFigureOut">
+            <a:fld id="{BABB1610-2A75-49FE-A607-969FDB94491C}" type="datetime1">
               <a:rPr lang="en-GB" smtClean="0"/>
-              <a:t>13/11/2018</a:t>
+              <a:t>10/01/2019</a:t>
             </a:fld>
             <a:endParaRPr lang="en-GB"/>
           </a:p>
@@ -1820,9 +2275,9 @@
           <a:bodyPr/>
           <a:lstStyle/>
           <a:p>
-            <a:fld id="{18BD90EC-E05E-4499-AEB7-1F606021F0B3}" type="datetimeFigureOut">
+            <a:fld id="{39BE8007-E349-4659-926A-3F001C8C2B72}" type="datetime1">
               <a:rPr lang="en-GB" smtClean="0"/>
-              <a:t>13/11/2018</a:t>
+              <a:t>10/01/2019</a:t>
             </a:fld>
             <a:endParaRPr lang="en-GB"/>
           </a:p>
@@ -2097,9 +2552,9 @@
           <a:bodyPr/>
           <a:lstStyle/>
           <a:p>
-            <a:fld id="{18BD90EC-E05E-4499-AEB7-1F606021F0B3}" type="datetimeFigureOut">
+            <a:fld id="{B9F3A34B-1CA1-4666-8ACF-1C03D498F753}" type="datetime1">
               <a:rPr lang="en-GB" smtClean="0"/>
-              <a:t>13/11/2018</a:t>
+              <a:t>10/01/2019</a:t>
             </a:fld>
             <a:endParaRPr lang="en-GB"/>
           </a:p>
@@ -2350,9 +2805,9 @@
           <a:bodyPr/>
           <a:lstStyle/>
           <a:p>
-            <a:fld id="{18BD90EC-E05E-4499-AEB7-1F606021F0B3}" type="datetimeFigureOut">
+            <a:fld id="{85A57E3E-EF61-44D7-AAA0-14EA6C26ECDE}" type="datetime1">
               <a:rPr lang="en-GB" smtClean="0"/>
-              <a:t>13/11/2018</a:t>
+              <a:t>10/01/2019</a:t>
             </a:fld>
             <a:endParaRPr lang="en-GB"/>
           </a:p>
@@ -2563,9 +3018,9 @@
             </a:lvl1pPr>
           </a:lstStyle>
           <a:p>
-            <a:fld id="{18BD90EC-E05E-4499-AEB7-1F606021F0B3}" type="datetimeFigureOut">
+            <a:fld id="{F7AD13C0-BA4E-4636-A52A-EB5528BBF051}" type="datetime1">
               <a:rPr lang="en-GB" smtClean="0"/>
-              <a:t>13/11/2018</a:t>
+              <a:t>10/01/2019</a:t>
             </a:fld>
             <a:endParaRPr lang="en-GB"/>
           </a:p>
@@ -2670,6 +3125,7 @@
     <p:sldLayoutId id="2147483658" r:id="rId10"/>
     <p:sldLayoutId id="2147483659" r:id="rId11"/>
   </p:sldLayoutIdLst>
+  <p:hf hdr="0" ftr="0" dt="0"/>
   <p:txStyles>
     <p:titleStyle>
       <a:lvl1pPr algn="l" defTabSz="914400" rtl="0" eaLnBrk="1" latinLnBrk="0" hangingPunct="1">
@@ -3032,6 +3488,449 @@
 </p:sld>
 </file>
 
+<file path=ppt/slides/slide10.xml><?xml version="1.0" encoding="utf-8"?>
+<p:sld xmlns:a="http://schemas.openxmlformats.org/drawingml/2006/main" xmlns:r="http://schemas.openxmlformats.org/officeDocument/2006/relationships" xmlns:p="http://schemas.openxmlformats.org/presentationml/2006/main">
+  <p:cSld>
+    <p:spTree>
+      <p:nvGrpSpPr>
+        <p:cNvPr id="1" name=""/>
+        <p:cNvGrpSpPr/>
+        <p:nvPr/>
+      </p:nvGrpSpPr>
+      <p:grpSpPr>
+        <a:xfrm>
+          <a:off x="0" y="0"/>
+          <a:ext cx="0" cy="0"/>
+          <a:chOff x="0" y="0"/>
+          <a:chExt cx="0" cy="0"/>
+        </a:xfrm>
+      </p:grpSpPr>
+      <p:sp>
+        <p:nvSpPr>
+          <p:cNvPr id="2" name="Title 1"/>
+          <p:cNvSpPr>
+            <a:spLocks noGrp="1"/>
+          </p:cNvSpPr>
+          <p:nvPr>
+            <p:ph type="title"/>
+          </p:nvPr>
+        </p:nvSpPr>
+        <p:spPr/>
+        <p:txBody>
+          <a:bodyPr/>
+          <a:lstStyle/>
+          <a:p>
+            <a:r>
+              <a:rPr lang="en-GB" dirty="0" smtClean="0"/>
+              <a:t>Deploying Workflows</a:t>
+            </a:r>
+            <a:endParaRPr lang="en-GB" dirty="0"/>
+          </a:p>
+        </p:txBody>
+      </p:sp>
+      <p:sp>
+        <p:nvSpPr>
+          <p:cNvPr id="3" name="Content Placeholder 2"/>
+          <p:cNvSpPr>
+            <a:spLocks noGrp="1"/>
+          </p:cNvSpPr>
+          <p:nvPr>
+            <p:ph idx="1"/>
+          </p:nvPr>
+        </p:nvSpPr>
+        <p:spPr/>
+        <p:txBody>
+          <a:bodyPr/>
+          <a:lstStyle/>
+          <a:p>
+            <a:r>
+              <a:rPr lang="en-GB" dirty="0" smtClean="0"/>
+              <a:t>Use Dynamics 365 Developer Toolkit Deployment project to deploy.</a:t>
+            </a:r>
+          </a:p>
+          <a:p>
+            <a:r>
+              <a:rPr lang="en-GB" dirty="0" err="1" smtClean="0"/>
+              <a:t>RegisterFile.crmregister</a:t>
+            </a:r>
+            <a:endParaRPr lang="en-GB" dirty="0" smtClean="0"/>
+          </a:p>
+          <a:p>
+            <a:r>
+              <a:rPr lang="en-GB" dirty="0" smtClean="0"/>
+              <a:t>Ensures consistency</a:t>
+            </a:r>
+            <a:endParaRPr lang="en-GB" dirty="0"/>
+          </a:p>
+        </p:txBody>
+      </p:sp>
+      <p:sp>
+        <p:nvSpPr>
+          <p:cNvPr id="4" name="Slide Number Placeholder 3"/>
+          <p:cNvSpPr>
+            <a:spLocks noGrp="1"/>
+          </p:cNvSpPr>
+          <p:nvPr>
+            <p:ph type="sldNum" sz="quarter" idx="12"/>
+          </p:nvPr>
+        </p:nvSpPr>
+        <p:spPr/>
+        <p:txBody>
+          <a:bodyPr/>
+          <a:lstStyle/>
+          <a:p>
+            <a:fld id="{4697367A-F411-4A3F-B2B6-75A972D0E9A9}" type="slidenum">
+              <a:rPr lang="en-GB" smtClean="0"/>
+              <a:t>10</a:t>
+            </a:fld>
+            <a:endParaRPr lang="en-GB"/>
+          </a:p>
+        </p:txBody>
+      </p:sp>
+    </p:spTree>
+    <p:extLst>
+      <p:ext uri="{BB962C8B-B14F-4D97-AF65-F5344CB8AC3E}">
+        <p14:creationId xmlns:p14="http://schemas.microsoft.com/office/powerpoint/2010/main" val="2978681543"/>
+      </p:ext>
+    </p:extLst>
+  </p:cSld>
+  <p:clrMapOvr>
+    <a:masterClrMapping/>
+  </p:clrMapOvr>
+  <p:timing>
+    <p:tnLst>
+      <p:par>
+        <p:cTn id="1" dur="indefinite" restart="never" nodeType="tmRoot"/>
+      </p:par>
+    </p:tnLst>
+  </p:timing>
+</p:sld>
+</file>
+
+<file path=ppt/slides/slide11.xml><?xml version="1.0" encoding="utf-8"?>
+<p:sld xmlns:a="http://schemas.openxmlformats.org/drawingml/2006/main" xmlns:r="http://schemas.openxmlformats.org/officeDocument/2006/relationships" xmlns:p="http://schemas.openxmlformats.org/presentationml/2006/main">
+  <p:cSld>
+    <p:spTree>
+      <p:nvGrpSpPr>
+        <p:cNvPr id="1" name=""/>
+        <p:cNvGrpSpPr/>
+        <p:nvPr/>
+      </p:nvGrpSpPr>
+      <p:grpSpPr>
+        <a:xfrm>
+          <a:off x="0" y="0"/>
+          <a:ext cx="0" cy="0"/>
+          <a:chOff x="0" y="0"/>
+          <a:chExt cx="0" cy="0"/>
+        </a:xfrm>
+      </p:grpSpPr>
+      <p:sp>
+        <p:nvSpPr>
+          <p:cNvPr id="2" name="Title 1"/>
+          <p:cNvSpPr>
+            <a:spLocks noGrp="1"/>
+          </p:cNvSpPr>
+          <p:nvPr>
+            <p:ph type="title"/>
+          </p:nvPr>
+        </p:nvSpPr>
+        <p:spPr/>
+        <p:txBody>
+          <a:bodyPr/>
+          <a:lstStyle/>
+          <a:p>
+            <a:r>
+              <a:rPr lang="en-GB" dirty="0" smtClean="0"/>
+              <a:t>Workflow assembly versions	</a:t>
+            </a:r>
+            <a:endParaRPr lang="en-GB" dirty="0"/>
+          </a:p>
+        </p:txBody>
+      </p:sp>
+      <p:sp>
+        <p:nvSpPr>
+          <p:cNvPr id="3" name="Content Placeholder 2"/>
+          <p:cNvSpPr>
+            <a:spLocks noGrp="1"/>
+          </p:cNvSpPr>
+          <p:nvPr>
+            <p:ph idx="1"/>
+          </p:nvPr>
+        </p:nvSpPr>
+        <p:spPr/>
+        <p:txBody>
+          <a:bodyPr>
+            <a:normAutofit fontScale="92500" lnSpcReduction="20000"/>
+          </a:bodyPr>
+          <a:lstStyle/>
+          <a:p>
+            <a:r>
+              <a:rPr lang="en-GB" dirty="0" smtClean="0"/>
+              <a:t>Be careful when changing the assembly version.</a:t>
+            </a:r>
+          </a:p>
+          <a:p>
+            <a:r>
+              <a:rPr lang="en-GB" dirty="0" smtClean="0"/>
+              <a:t>1.3.4.5</a:t>
+            </a:r>
+          </a:p>
+          <a:p>
+            <a:r>
+              <a:rPr lang="en-GB" dirty="0" err="1" smtClean="0"/>
+              <a:t>Major.minor.build.revision</a:t>
+            </a:r>
+            <a:endParaRPr lang="en-GB" dirty="0" smtClean="0"/>
+          </a:p>
+          <a:p>
+            <a:r>
+              <a:rPr lang="en-GB" dirty="0" smtClean="0"/>
+              <a:t>Update workflow – public interface unchanged.</a:t>
+            </a:r>
+          </a:p>
+          <a:p>
+            <a:r>
+              <a:rPr lang="en-GB" dirty="0" smtClean="0"/>
+              <a:t>Only change build or revision.</a:t>
+            </a:r>
+          </a:p>
+          <a:p>
+            <a:r>
+              <a:rPr lang="en-GB" dirty="0" smtClean="0"/>
+              <a:t>Existing workflows will pick up the updated assembly.</a:t>
+            </a:r>
+          </a:p>
+          <a:p>
+            <a:r>
+              <a:rPr lang="en-GB" dirty="0" smtClean="0"/>
+              <a:t>Upgrade – significant differences.</a:t>
+            </a:r>
+          </a:p>
+          <a:p>
+            <a:r>
+              <a:rPr lang="en-GB" dirty="0" smtClean="0"/>
+              <a:t>Change major or minor version.  Keep Name, Key Culture the same.</a:t>
+            </a:r>
+          </a:p>
+          <a:p>
+            <a:r>
+              <a:rPr lang="en-GB" dirty="0" smtClean="0"/>
+              <a:t>Existing Workflows keep the old version.</a:t>
+            </a:r>
+          </a:p>
+          <a:p>
+            <a:r>
+              <a:rPr lang="en-GB" dirty="0" smtClean="0"/>
+              <a:t>Should </a:t>
+            </a:r>
+            <a:endParaRPr lang="en-GB" dirty="0"/>
+          </a:p>
+        </p:txBody>
+      </p:sp>
+      <p:sp>
+        <p:nvSpPr>
+          <p:cNvPr id="4" name="Slide Number Placeholder 3"/>
+          <p:cNvSpPr>
+            <a:spLocks noGrp="1"/>
+          </p:cNvSpPr>
+          <p:nvPr>
+            <p:ph type="sldNum" sz="quarter" idx="12"/>
+          </p:nvPr>
+        </p:nvSpPr>
+        <p:spPr/>
+        <p:txBody>
+          <a:bodyPr/>
+          <a:lstStyle/>
+          <a:p>
+            <a:fld id="{4697367A-F411-4A3F-B2B6-75A972D0E9A9}" type="slidenum">
+              <a:rPr lang="en-GB" smtClean="0"/>
+              <a:t>11</a:t>
+            </a:fld>
+            <a:endParaRPr lang="en-GB"/>
+          </a:p>
+        </p:txBody>
+      </p:sp>
+    </p:spTree>
+    <p:extLst>
+      <p:ext uri="{BB962C8B-B14F-4D97-AF65-F5344CB8AC3E}">
+        <p14:creationId xmlns:p14="http://schemas.microsoft.com/office/powerpoint/2010/main" val="356291784"/>
+      </p:ext>
+    </p:extLst>
+  </p:cSld>
+  <p:clrMapOvr>
+    <a:masterClrMapping/>
+  </p:clrMapOvr>
+  <p:timing>
+    <p:tnLst>
+      <p:par>
+        <p:cTn id="1" dur="indefinite" restart="never" nodeType="tmRoot"/>
+      </p:par>
+    </p:tnLst>
+  </p:timing>
+</p:sld>
+</file>
+
+<file path=ppt/slides/slide12.xml><?xml version="1.0" encoding="utf-8"?>
+<p:sld xmlns:a="http://schemas.openxmlformats.org/drawingml/2006/main" xmlns:r="http://schemas.openxmlformats.org/officeDocument/2006/relationships" xmlns:p="http://schemas.openxmlformats.org/presentationml/2006/main">
+  <p:cSld>
+    <p:spTree>
+      <p:nvGrpSpPr>
+        <p:cNvPr id="1" name=""/>
+        <p:cNvGrpSpPr/>
+        <p:nvPr/>
+      </p:nvGrpSpPr>
+      <p:grpSpPr>
+        <a:xfrm>
+          <a:off x="0" y="0"/>
+          <a:ext cx="0" cy="0"/>
+          <a:chOff x="0" y="0"/>
+          <a:chExt cx="0" cy="0"/>
+        </a:xfrm>
+      </p:grpSpPr>
+      <p:sp>
+        <p:nvSpPr>
+          <p:cNvPr id="2" name="Title 1"/>
+          <p:cNvSpPr>
+            <a:spLocks noGrp="1"/>
+          </p:cNvSpPr>
+          <p:nvPr>
+            <p:ph type="title"/>
+          </p:nvPr>
+        </p:nvSpPr>
+        <p:spPr/>
+        <p:txBody>
+          <a:bodyPr/>
+          <a:lstStyle/>
+          <a:p>
+            <a:r>
+              <a:rPr lang="en-GB" dirty="0" smtClean="0"/>
+              <a:t>Merging Assemblies	</a:t>
+            </a:r>
+            <a:endParaRPr lang="en-GB" dirty="0"/>
+          </a:p>
+        </p:txBody>
+      </p:sp>
+      <p:sp>
+        <p:nvSpPr>
+          <p:cNvPr id="3" name="Content Placeholder 2"/>
+          <p:cNvSpPr>
+            <a:spLocks noGrp="1"/>
+          </p:cNvSpPr>
+          <p:nvPr>
+            <p:ph idx="1"/>
+          </p:nvPr>
+        </p:nvSpPr>
+        <p:spPr/>
+        <p:txBody>
+          <a:bodyPr/>
+          <a:lstStyle/>
+          <a:p>
+            <a:r>
+              <a:rPr lang="en-GB" dirty="0" smtClean="0"/>
+              <a:t>Problem – your plugin/custom activity depends on 3</a:t>
+            </a:r>
+            <a:r>
+              <a:rPr lang="en-GB" baseline="30000" dirty="0" smtClean="0"/>
+              <a:t>rd</a:t>
+            </a:r>
+            <a:r>
+              <a:rPr lang="en-GB" dirty="0" smtClean="0"/>
+              <a:t> party assemblies.</a:t>
+            </a:r>
+          </a:p>
+          <a:p>
+            <a:r>
+              <a:rPr lang="en-GB" dirty="0" smtClean="0"/>
+              <a:t>How do you make these available to your plugin</a:t>
+            </a:r>
+          </a:p>
+          <a:p>
+            <a:r>
+              <a:rPr lang="en-GB" dirty="0" smtClean="0"/>
+              <a:t>Use </a:t>
+            </a:r>
+            <a:r>
+              <a:rPr lang="en-GB" dirty="0" err="1" smtClean="0"/>
+              <a:t>ilmerge</a:t>
+            </a:r>
+            <a:endParaRPr lang="en-GB" dirty="0" smtClean="0"/>
+          </a:p>
+          <a:p>
+            <a:r>
+              <a:rPr lang="en-GB" dirty="0" smtClean="0"/>
+              <a:t>Set “</a:t>
+            </a:r>
+            <a:r>
+              <a:rPr lang="en-GB" dirty="0" err="1" smtClean="0"/>
+              <a:t>CopyLocal</a:t>
+            </a:r>
+            <a:r>
+              <a:rPr lang="en-GB" dirty="0" smtClean="0"/>
+              <a:t> = false” on any </a:t>
+            </a:r>
+            <a:r>
+              <a:rPr lang="en-GB" dirty="0" err="1" smtClean="0"/>
+              <a:t>Microsoft.Xrm</a:t>
+            </a:r>
+            <a:r>
+              <a:rPr lang="en-GB" dirty="0" smtClean="0"/>
+              <a:t> </a:t>
+            </a:r>
+            <a:r>
+              <a:rPr lang="en-GB" dirty="0" err="1" smtClean="0"/>
+              <a:t>etc</a:t>
+            </a:r>
+            <a:r>
+              <a:rPr lang="en-GB" smtClean="0"/>
+              <a:t> assemblies.</a:t>
+            </a:r>
+            <a:endParaRPr lang="en-GB" dirty="0"/>
+          </a:p>
+        </p:txBody>
+      </p:sp>
+      <p:sp>
+        <p:nvSpPr>
+          <p:cNvPr id="4" name="Slide Number Placeholder 3"/>
+          <p:cNvSpPr>
+            <a:spLocks noGrp="1"/>
+          </p:cNvSpPr>
+          <p:nvPr>
+            <p:ph type="sldNum" sz="quarter" idx="12"/>
+          </p:nvPr>
+        </p:nvSpPr>
+        <p:spPr/>
+        <p:txBody>
+          <a:bodyPr/>
+          <a:lstStyle/>
+          <a:p>
+            <a:fld id="{4697367A-F411-4A3F-B2B6-75A972D0E9A9}" type="slidenum">
+              <a:rPr lang="en-GB" smtClean="0"/>
+              <a:t>12</a:t>
+            </a:fld>
+            <a:endParaRPr lang="en-GB"/>
+          </a:p>
+        </p:txBody>
+      </p:sp>
+    </p:spTree>
+    <p:extLst>
+      <p:ext uri="{BB962C8B-B14F-4D97-AF65-F5344CB8AC3E}">
+        <p14:creationId xmlns:p14="http://schemas.microsoft.com/office/powerpoint/2010/main" val="1051107058"/>
+      </p:ext>
+    </p:extLst>
+  </p:cSld>
+  <p:clrMapOvr>
+    <a:masterClrMapping/>
+  </p:clrMapOvr>
+  <p:timing>
+    <p:tnLst>
+      <p:par>
+        <p:cTn id="1" dur="indefinite" restart="never" nodeType="tmRoot"/>
+      </p:par>
+    </p:tnLst>
+  </p:timing>
+</p:sld>
+</file>
+
 <file path=ppt/slides/slide2.xml><?xml version="1.0" encoding="utf-8"?>
 <p:sld xmlns:a="http://schemas.openxmlformats.org/drawingml/2006/main" xmlns:r="http://schemas.openxmlformats.org/officeDocument/2006/relationships" xmlns:p="http://schemas.openxmlformats.org/presentationml/2006/main">
   <p:cSld>
@@ -3049,6 +3948,661 @@
           <a:chExt cx="0" cy="0"/>
         </a:xfrm>
       </p:grpSpPr>
+      <p:pic>
+        <p:nvPicPr>
+          <p:cNvPr id="5" name="Picture 4"/>
+          <p:cNvPicPr>
+            <a:picLocks noChangeAspect="1"/>
+          </p:cNvPicPr>
+          <p:nvPr/>
+        </p:nvPicPr>
+        <p:blipFill>
+          <a:blip r:embed="rId2">
+            <a:extLst>
+              <a:ext uri="{BEBA8EAE-BF5A-486C-A8C5-ECC9F3942E4B}">
+                <a14:imgProps xmlns:a14="http://schemas.microsoft.com/office/drawing/2010/main">
+                  <a14:imgLayer r:embed="rId3">
+                    <a14:imgEffect>
+                      <a14:brightnessContrast bright="2000"/>
+                    </a14:imgEffect>
+                  </a14:imgLayer>
+                </a14:imgProps>
+              </a:ext>
+            </a:extLst>
+          </a:blip>
+          <a:stretch>
+            <a:fillRect/>
+          </a:stretch>
+        </p:blipFill>
+        <p:spPr>
+          <a:xfrm>
+            <a:off x="4666106" y="2283480"/>
+            <a:ext cx="7160250" cy="4283219"/>
+          </a:xfrm>
+          <a:prstGeom prst="rect">
+            <a:avLst/>
+          </a:prstGeom>
+          <a:noFill/>
+        </p:spPr>
+      </p:pic>
+      <p:sp>
+        <p:nvSpPr>
+          <p:cNvPr id="2" name="Title 1"/>
+          <p:cNvSpPr>
+            <a:spLocks noGrp="1"/>
+          </p:cNvSpPr>
+          <p:nvPr>
+            <p:ph type="title"/>
+          </p:nvPr>
+        </p:nvSpPr>
+        <p:spPr/>
+        <p:txBody>
+          <a:bodyPr/>
+          <a:lstStyle/>
+          <a:p>
+            <a:r>
+              <a:rPr lang="en-GB" dirty="0" smtClean="0"/>
+              <a:t>Setting up online Trial</a:t>
+            </a:r>
+            <a:endParaRPr lang="en-GB" dirty="0"/>
+          </a:p>
+        </p:txBody>
+      </p:sp>
+      <p:sp>
+        <p:nvSpPr>
+          <p:cNvPr id="3" name="Content Placeholder 2"/>
+          <p:cNvSpPr>
+            <a:spLocks noGrp="1"/>
+          </p:cNvSpPr>
+          <p:nvPr>
+            <p:ph idx="1"/>
+          </p:nvPr>
+        </p:nvSpPr>
+        <p:spPr/>
+        <p:txBody>
+          <a:bodyPr/>
+          <a:lstStyle/>
+          <a:p>
+            <a:r>
+              <a:rPr lang="en-GB" dirty="0" smtClean="0"/>
+              <a:t>Go to </a:t>
+            </a:r>
+            <a:r>
+              <a:rPr lang="en-GB" dirty="0" smtClean="0">
+                <a:hlinkClick r:id="rId4"/>
+              </a:rPr>
+              <a:t>https://trials.dynamics.com</a:t>
+            </a:r>
+            <a:endParaRPr lang="en-GB" dirty="0" smtClean="0"/>
+          </a:p>
+          <a:p>
+            <a:r>
+              <a:rPr lang="en-GB" dirty="0" smtClean="0"/>
+              <a:t>Select “Sales”</a:t>
+            </a:r>
+          </a:p>
+          <a:p>
+            <a:r>
+              <a:rPr lang="en-GB" dirty="0" smtClean="0"/>
+              <a:t>click on “Sign up here”</a:t>
+            </a:r>
+          </a:p>
+          <a:p>
+            <a:endParaRPr lang="en-GB" dirty="0" smtClean="0"/>
+          </a:p>
+          <a:p>
+            <a:endParaRPr lang="en-GB" dirty="0"/>
+          </a:p>
+        </p:txBody>
+      </p:sp>
+      <p:sp>
+        <p:nvSpPr>
+          <p:cNvPr id="6" name="Slide Number Placeholder 5"/>
+          <p:cNvSpPr>
+            <a:spLocks noGrp="1"/>
+          </p:cNvSpPr>
+          <p:nvPr>
+            <p:ph type="sldNum" sz="quarter" idx="12"/>
+          </p:nvPr>
+        </p:nvSpPr>
+        <p:spPr/>
+        <p:txBody>
+          <a:bodyPr/>
+          <a:lstStyle/>
+          <a:p>
+            <a:fld id="{4697367A-F411-4A3F-B2B6-75A972D0E9A9}" type="slidenum">
+              <a:rPr lang="en-GB" smtClean="0"/>
+              <a:t>2</a:t>
+            </a:fld>
+            <a:endParaRPr lang="en-GB"/>
+          </a:p>
+        </p:txBody>
+      </p:sp>
+    </p:spTree>
+    <p:extLst>
+      <p:ext uri="{BB962C8B-B14F-4D97-AF65-F5344CB8AC3E}">
+        <p14:creationId xmlns:p14="http://schemas.microsoft.com/office/powerpoint/2010/main" val="4062689986"/>
+      </p:ext>
+    </p:extLst>
+  </p:cSld>
+  <p:clrMapOvr>
+    <a:masterClrMapping/>
+  </p:clrMapOvr>
+</p:sld>
+</file>
+
+<file path=ppt/slides/slide3.xml><?xml version="1.0" encoding="utf-8"?>
+<p:sld xmlns:a="http://schemas.openxmlformats.org/drawingml/2006/main" xmlns:r="http://schemas.openxmlformats.org/officeDocument/2006/relationships" xmlns:p="http://schemas.openxmlformats.org/presentationml/2006/main">
+  <p:cSld>
+    <p:spTree>
+      <p:nvGrpSpPr>
+        <p:cNvPr id="1" name=""/>
+        <p:cNvGrpSpPr/>
+        <p:nvPr/>
+      </p:nvGrpSpPr>
+      <p:grpSpPr>
+        <a:xfrm>
+          <a:off x="0" y="0"/>
+          <a:ext cx="0" cy="0"/>
+          <a:chOff x="0" y="0"/>
+          <a:chExt cx="0" cy="0"/>
+        </a:xfrm>
+      </p:grpSpPr>
+      <p:sp>
+        <p:nvSpPr>
+          <p:cNvPr id="2" name="Title 1"/>
+          <p:cNvSpPr>
+            <a:spLocks noGrp="1"/>
+          </p:cNvSpPr>
+          <p:nvPr>
+            <p:ph type="title"/>
+          </p:nvPr>
+        </p:nvSpPr>
+        <p:spPr/>
+        <p:txBody>
+          <a:bodyPr/>
+          <a:lstStyle/>
+          <a:p>
+            <a:r>
+              <a:rPr lang="en-GB" dirty="0" smtClean="0"/>
+              <a:t>Set up online trial</a:t>
+            </a:r>
+            <a:endParaRPr lang="en-GB" dirty="0"/>
+          </a:p>
+        </p:txBody>
+      </p:sp>
+      <p:sp>
+        <p:nvSpPr>
+          <p:cNvPr id="3" name="Content Placeholder 2"/>
+          <p:cNvSpPr>
+            <a:spLocks noGrp="1"/>
+          </p:cNvSpPr>
+          <p:nvPr>
+            <p:ph idx="1"/>
+          </p:nvPr>
+        </p:nvSpPr>
+        <p:spPr/>
+        <p:txBody>
+          <a:bodyPr/>
+          <a:lstStyle/>
+          <a:p>
+            <a:r>
+              <a:rPr lang="en-GB" dirty="0" smtClean="0"/>
+              <a:t>Choose “No, continue signing up”</a:t>
+            </a:r>
+          </a:p>
+          <a:p>
+            <a:endParaRPr lang="en-GB" dirty="0"/>
+          </a:p>
+        </p:txBody>
+      </p:sp>
+      <p:pic>
+        <p:nvPicPr>
+          <p:cNvPr id="4" name="Picture 3"/>
+          <p:cNvPicPr>
+            <a:picLocks noChangeAspect="1"/>
+          </p:cNvPicPr>
+          <p:nvPr/>
+        </p:nvPicPr>
+        <p:blipFill>
+          <a:blip r:embed="rId2"/>
+          <a:stretch>
+            <a:fillRect/>
+          </a:stretch>
+        </p:blipFill>
+        <p:spPr>
+          <a:xfrm>
+            <a:off x="4014061" y="2183596"/>
+            <a:ext cx="7145868" cy="4274616"/>
+          </a:xfrm>
+          <a:prstGeom prst="rect">
+            <a:avLst/>
+          </a:prstGeom>
+        </p:spPr>
+      </p:pic>
+      <p:sp>
+        <p:nvSpPr>
+          <p:cNvPr id="5" name="Slide Number Placeholder 4"/>
+          <p:cNvSpPr>
+            <a:spLocks noGrp="1"/>
+          </p:cNvSpPr>
+          <p:nvPr>
+            <p:ph type="sldNum" sz="quarter" idx="12"/>
+          </p:nvPr>
+        </p:nvSpPr>
+        <p:spPr/>
+        <p:txBody>
+          <a:bodyPr/>
+          <a:lstStyle/>
+          <a:p>
+            <a:fld id="{4697367A-F411-4A3F-B2B6-75A972D0E9A9}" type="slidenum">
+              <a:rPr lang="en-GB" smtClean="0"/>
+              <a:t>3</a:t>
+            </a:fld>
+            <a:endParaRPr lang="en-GB"/>
+          </a:p>
+        </p:txBody>
+      </p:sp>
+    </p:spTree>
+    <p:extLst>
+      <p:ext uri="{BB962C8B-B14F-4D97-AF65-F5344CB8AC3E}">
+        <p14:creationId xmlns:p14="http://schemas.microsoft.com/office/powerpoint/2010/main" val="3536291950"/>
+      </p:ext>
+    </p:extLst>
+  </p:cSld>
+  <p:clrMapOvr>
+    <a:masterClrMapping/>
+  </p:clrMapOvr>
+</p:sld>
+</file>
+
+<file path=ppt/slides/slide4.xml><?xml version="1.0" encoding="utf-8"?>
+<p:sld xmlns:a="http://schemas.openxmlformats.org/drawingml/2006/main" xmlns:r="http://schemas.openxmlformats.org/officeDocument/2006/relationships" xmlns:p="http://schemas.openxmlformats.org/presentationml/2006/main">
+  <p:cSld>
+    <p:spTree>
+      <p:nvGrpSpPr>
+        <p:cNvPr id="1" name=""/>
+        <p:cNvGrpSpPr/>
+        <p:nvPr/>
+      </p:nvGrpSpPr>
+      <p:grpSpPr>
+        <a:xfrm>
+          <a:off x="0" y="0"/>
+          <a:ext cx="0" cy="0"/>
+          <a:chOff x="0" y="0"/>
+          <a:chExt cx="0" cy="0"/>
+        </a:xfrm>
+      </p:grpSpPr>
+      <p:sp>
+        <p:nvSpPr>
+          <p:cNvPr id="2" name="Title 1"/>
+          <p:cNvSpPr>
+            <a:spLocks noGrp="1"/>
+          </p:cNvSpPr>
+          <p:nvPr>
+            <p:ph type="title"/>
+          </p:nvPr>
+        </p:nvSpPr>
+        <p:spPr/>
+        <p:txBody>
+          <a:bodyPr/>
+          <a:lstStyle/>
+          <a:p>
+            <a:r>
+              <a:rPr lang="en-GB" dirty="0" smtClean="0"/>
+              <a:t>Setup online trial</a:t>
+            </a:r>
+            <a:endParaRPr lang="en-GB" dirty="0"/>
+          </a:p>
+        </p:txBody>
+      </p:sp>
+      <p:sp>
+        <p:nvSpPr>
+          <p:cNvPr id="3" name="Content Placeholder 2"/>
+          <p:cNvSpPr>
+            <a:spLocks noGrp="1"/>
+          </p:cNvSpPr>
+          <p:nvPr>
+            <p:ph idx="1"/>
+          </p:nvPr>
+        </p:nvSpPr>
+        <p:spPr/>
+        <p:txBody>
+          <a:bodyPr/>
+          <a:lstStyle/>
+          <a:p>
+            <a:r>
+              <a:rPr lang="en-GB" dirty="0" smtClean="0"/>
+              <a:t>Select UK, enter personal details</a:t>
+            </a:r>
+          </a:p>
+          <a:p>
+            <a:endParaRPr lang="en-GB" dirty="0"/>
+          </a:p>
+        </p:txBody>
+      </p:sp>
+      <p:sp>
+        <p:nvSpPr>
+          <p:cNvPr id="4" name="Slide Number Placeholder 3"/>
+          <p:cNvSpPr>
+            <a:spLocks noGrp="1"/>
+          </p:cNvSpPr>
+          <p:nvPr>
+            <p:ph type="sldNum" sz="quarter" idx="12"/>
+          </p:nvPr>
+        </p:nvSpPr>
+        <p:spPr/>
+        <p:txBody>
+          <a:bodyPr/>
+          <a:lstStyle/>
+          <a:p>
+            <a:fld id="{4697367A-F411-4A3F-B2B6-75A972D0E9A9}" type="slidenum">
+              <a:rPr lang="en-GB" smtClean="0"/>
+              <a:t>4</a:t>
+            </a:fld>
+            <a:endParaRPr lang="en-GB"/>
+          </a:p>
+        </p:txBody>
+      </p:sp>
+      <p:pic>
+        <p:nvPicPr>
+          <p:cNvPr id="6" name="Picture 5"/>
+          <p:cNvPicPr>
+            <a:picLocks noChangeAspect="1"/>
+          </p:cNvPicPr>
+          <p:nvPr/>
+        </p:nvPicPr>
+        <p:blipFill>
+          <a:blip r:embed="rId2"/>
+          <a:stretch>
+            <a:fillRect/>
+          </a:stretch>
+        </p:blipFill>
+        <p:spPr>
+          <a:xfrm>
+            <a:off x="4176793" y="2280941"/>
+            <a:ext cx="6983136" cy="4177271"/>
+          </a:xfrm>
+          <a:prstGeom prst="rect">
+            <a:avLst/>
+          </a:prstGeom>
+        </p:spPr>
+      </p:pic>
+    </p:spTree>
+    <p:extLst>
+      <p:ext uri="{BB962C8B-B14F-4D97-AF65-F5344CB8AC3E}">
+        <p14:creationId xmlns:p14="http://schemas.microsoft.com/office/powerpoint/2010/main" val="28386845"/>
+      </p:ext>
+    </p:extLst>
+  </p:cSld>
+  <p:clrMapOvr>
+    <a:masterClrMapping/>
+  </p:clrMapOvr>
+</p:sld>
+</file>
+
+<file path=ppt/slides/slide5.xml><?xml version="1.0" encoding="utf-8"?>
+<p:sld xmlns:a="http://schemas.openxmlformats.org/drawingml/2006/main" xmlns:r="http://schemas.openxmlformats.org/officeDocument/2006/relationships" xmlns:p="http://schemas.openxmlformats.org/presentationml/2006/main">
+  <p:cSld>
+    <p:spTree>
+      <p:nvGrpSpPr>
+        <p:cNvPr id="1" name=""/>
+        <p:cNvGrpSpPr/>
+        <p:nvPr/>
+      </p:nvGrpSpPr>
+      <p:grpSpPr>
+        <a:xfrm>
+          <a:off x="0" y="0"/>
+          <a:ext cx="0" cy="0"/>
+          <a:chOff x="0" y="0"/>
+          <a:chExt cx="0" cy="0"/>
+        </a:xfrm>
+      </p:grpSpPr>
+      <p:sp>
+        <p:nvSpPr>
+          <p:cNvPr id="2" name="Title 1"/>
+          <p:cNvSpPr>
+            <a:spLocks noGrp="1"/>
+          </p:cNvSpPr>
+          <p:nvPr>
+            <p:ph type="title"/>
+          </p:nvPr>
+        </p:nvSpPr>
+        <p:spPr>
+          <a:xfrm>
+            <a:off x="838200" y="320675"/>
+            <a:ext cx="10515600" cy="1325563"/>
+          </a:xfrm>
+        </p:spPr>
+        <p:txBody>
+          <a:bodyPr/>
+          <a:lstStyle/>
+          <a:p>
+            <a:r>
+              <a:rPr lang="en-GB" dirty="0" smtClean="0"/>
+              <a:t>Setup online trial</a:t>
+            </a:r>
+            <a:endParaRPr lang="en-GB" dirty="0"/>
+          </a:p>
+        </p:txBody>
+      </p:sp>
+      <p:sp>
+        <p:nvSpPr>
+          <p:cNvPr id="3" name="Content Placeholder 2"/>
+          <p:cNvSpPr>
+            <a:spLocks noGrp="1"/>
+          </p:cNvSpPr>
+          <p:nvPr>
+            <p:ph idx="1"/>
+          </p:nvPr>
+        </p:nvSpPr>
+        <p:spPr/>
+        <p:txBody>
+          <a:bodyPr/>
+          <a:lstStyle/>
+          <a:p>
+            <a:r>
+              <a:rPr lang="en-GB" dirty="0" smtClean="0"/>
+              <a:t>Create a user ID</a:t>
+            </a:r>
+          </a:p>
+          <a:p>
+            <a:r>
+              <a:rPr lang="en-GB" dirty="0" smtClean="0"/>
+              <a:t>Chose a short user id and company name.</a:t>
+            </a:r>
+          </a:p>
+          <a:p>
+            <a:endParaRPr lang="en-GB" dirty="0"/>
+          </a:p>
+        </p:txBody>
+      </p:sp>
+      <p:sp>
+        <p:nvSpPr>
+          <p:cNvPr id="4" name="Slide Number Placeholder 3"/>
+          <p:cNvSpPr>
+            <a:spLocks noGrp="1"/>
+          </p:cNvSpPr>
+          <p:nvPr>
+            <p:ph type="sldNum" sz="quarter" idx="12"/>
+          </p:nvPr>
+        </p:nvSpPr>
+        <p:spPr/>
+        <p:txBody>
+          <a:bodyPr/>
+          <a:lstStyle/>
+          <a:p>
+            <a:fld id="{4697367A-F411-4A3F-B2B6-75A972D0E9A9}" type="slidenum">
+              <a:rPr lang="en-GB" smtClean="0"/>
+              <a:t>5</a:t>
+            </a:fld>
+            <a:endParaRPr lang="en-GB"/>
+          </a:p>
+        </p:txBody>
+      </p:sp>
+      <p:pic>
+        <p:nvPicPr>
+          <p:cNvPr id="6" name="Picture 5"/>
+          <p:cNvPicPr>
+            <a:picLocks noChangeAspect="1"/>
+          </p:cNvPicPr>
+          <p:nvPr/>
+        </p:nvPicPr>
+        <p:blipFill>
+          <a:blip r:embed="rId3"/>
+          <a:stretch>
+            <a:fillRect/>
+          </a:stretch>
+        </p:blipFill>
+        <p:spPr>
+          <a:xfrm>
+            <a:off x="4695135" y="2783840"/>
+            <a:ext cx="6277347" cy="3755072"/>
+          </a:xfrm>
+          <a:prstGeom prst="rect">
+            <a:avLst/>
+          </a:prstGeom>
+        </p:spPr>
+      </p:pic>
+    </p:spTree>
+    <p:extLst>
+      <p:ext uri="{BB962C8B-B14F-4D97-AF65-F5344CB8AC3E}">
+        <p14:creationId xmlns:p14="http://schemas.microsoft.com/office/powerpoint/2010/main" val="10859605"/>
+      </p:ext>
+    </p:extLst>
+  </p:cSld>
+  <p:clrMapOvr>
+    <a:masterClrMapping/>
+  </p:clrMapOvr>
+</p:sld>
+</file>
+
+<file path=ppt/slides/slide6.xml><?xml version="1.0" encoding="utf-8"?>
+<p:sld xmlns:a="http://schemas.openxmlformats.org/drawingml/2006/main" xmlns:r="http://schemas.openxmlformats.org/officeDocument/2006/relationships" xmlns:p="http://schemas.openxmlformats.org/presentationml/2006/main">
+  <p:cSld>
+    <p:spTree>
+      <p:nvGrpSpPr>
+        <p:cNvPr id="1" name=""/>
+        <p:cNvGrpSpPr/>
+        <p:nvPr/>
+      </p:nvGrpSpPr>
+      <p:grpSpPr>
+        <a:xfrm>
+          <a:off x="0" y="0"/>
+          <a:ext cx="0" cy="0"/>
+          <a:chOff x="0" y="0"/>
+          <a:chExt cx="0" cy="0"/>
+        </a:xfrm>
+      </p:grpSpPr>
+      <p:sp>
+        <p:nvSpPr>
+          <p:cNvPr id="2" name="Title 1"/>
+          <p:cNvSpPr>
+            <a:spLocks noGrp="1"/>
+          </p:cNvSpPr>
+          <p:nvPr>
+            <p:ph type="title"/>
+          </p:nvPr>
+        </p:nvSpPr>
+        <p:spPr/>
+        <p:txBody>
+          <a:bodyPr/>
+          <a:lstStyle/>
+          <a:p>
+            <a:r>
+              <a:rPr lang="en-GB" dirty="0" smtClean="0"/>
+              <a:t>Set up online trial</a:t>
+            </a:r>
+            <a:endParaRPr lang="en-GB" dirty="0"/>
+          </a:p>
+        </p:txBody>
+      </p:sp>
+      <p:sp>
+        <p:nvSpPr>
+          <p:cNvPr id="3" name="Content Placeholder 2"/>
+          <p:cNvSpPr>
+            <a:spLocks noGrp="1"/>
+          </p:cNvSpPr>
+          <p:nvPr>
+            <p:ph idx="1"/>
+          </p:nvPr>
+        </p:nvSpPr>
+        <p:spPr/>
+        <p:txBody>
+          <a:bodyPr/>
+          <a:lstStyle/>
+          <a:p>
+            <a:r>
+              <a:rPr lang="en-GB" dirty="0" smtClean="0"/>
+              <a:t>Enter phone number </a:t>
+            </a:r>
+            <a:r>
+              <a:rPr lang="en-GB" dirty="0" err="1" smtClean="0"/>
+              <a:t>etc</a:t>
+            </a:r>
+            <a:r>
+              <a:rPr lang="en-GB" dirty="0" smtClean="0"/>
+              <a:t> to verify identity</a:t>
+            </a:r>
+          </a:p>
+          <a:p>
+            <a:endParaRPr lang="en-GB" dirty="0"/>
+          </a:p>
+        </p:txBody>
+      </p:sp>
+      <p:sp>
+        <p:nvSpPr>
+          <p:cNvPr id="4" name="Slide Number Placeholder 3"/>
+          <p:cNvSpPr>
+            <a:spLocks noGrp="1"/>
+          </p:cNvSpPr>
+          <p:nvPr>
+            <p:ph type="sldNum" sz="quarter" idx="12"/>
+          </p:nvPr>
+        </p:nvSpPr>
+        <p:spPr/>
+        <p:txBody>
+          <a:bodyPr/>
+          <a:lstStyle/>
+          <a:p>
+            <a:fld id="{4697367A-F411-4A3F-B2B6-75A972D0E9A9}" type="slidenum">
+              <a:rPr lang="en-GB" smtClean="0"/>
+              <a:t>6</a:t>
+            </a:fld>
+            <a:endParaRPr lang="en-GB"/>
+          </a:p>
+        </p:txBody>
+      </p:sp>
+    </p:spTree>
+    <p:extLst>
+      <p:ext uri="{BB962C8B-B14F-4D97-AF65-F5344CB8AC3E}">
+        <p14:creationId xmlns:p14="http://schemas.microsoft.com/office/powerpoint/2010/main" val="30928167"/>
+      </p:ext>
+    </p:extLst>
+  </p:cSld>
+  <p:clrMapOvr>
+    <a:masterClrMapping/>
+  </p:clrMapOvr>
+</p:sld>
+</file>
+
+<file path=ppt/slides/slide7.xml><?xml version="1.0" encoding="utf-8"?>
+<p:sld xmlns:a="http://schemas.openxmlformats.org/drawingml/2006/main" xmlns:r="http://schemas.openxmlformats.org/officeDocument/2006/relationships" xmlns:p="http://schemas.openxmlformats.org/presentationml/2006/main">
+  <p:cSld>
+    <p:spTree>
+      <p:nvGrpSpPr>
+        <p:cNvPr id="1" name=""/>
+        <p:cNvGrpSpPr/>
+        <p:nvPr/>
+      </p:nvGrpSpPr>
+      <p:grpSpPr>
+        <a:xfrm>
+          <a:off x="0" y="0"/>
+          <a:ext cx="0" cy="0"/>
+          <a:chOff x="0" y="0"/>
+          <a:chExt cx="0" cy="0"/>
+        </a:xfrm>
+      </p:grpSpPr>
       <p:sp>
         <p:nvSpPr>
           <p:cNvPr id="2" name="Title 1"/>
@@ -3092,6 +4646,29 @@
               <a:t>Give different systems a different colour</a:t>
             </a:r>
             <a:endParaRPr lang="en-GB" dirty="0"/>
+          </a:p>
+        </p:txBody>
+      </p:sp>
+      <p:sp>
+        <p:nvSpPr>
+          <p:cNvPr id="4" name="Slide Number Placeholder 3"/>
+          <p:cNvSpPr>
+            <a:spLocks noGrp="1"/>
+          </p:cNvSpPr>
+          <p:nvPr>
+            <p:ph type="sldNum" sz="quarter" idx="12"/>
+          </p:nvPr>
+        </p:nvSpPr>
+        <p:spPr/>
+        <p:txBody>
+          <a:bodyPr/>
+          <a:lstStyle/>
+          <a:p>
+            <a:fld id="{4697367A-F411-4A3F-B2B6-75A972D0E9A9}" type="slidenum">
+              <a:rPr lang="en-GB" smtClean="0"/>
+              <a:t>7</a:t>
+            </a:fld>
+            <a:endParaRPr lang="en-GB"/>
           </a:p>
         </p:txBody>
       </p:sp>
@@ -3115,7 +4692,7 @@
 </p:sld>
 </file>
 
-<file path=ppt/slides/slide3.xml><?xml version="1.0" encoding="utf-8"?>
+<file path=ppt/slides/slide8.xml><?xml version="1.0" encoding="utf-8"?>
 <p:sld xmlns:a="http://schemas.openxmlformats.org/drawingml/2006/main" xmlns:r="http://schemas.openxmlformats.org/officeDocument/2006/relationships" xmlns:p="http://schemas.openxmlformats.org/presentationml/2006/main">
   <p:cSld>
     <p:spTree>
@@ -3185,6 +4762,29 @@
               <a:t>FakeXrmEasy</a:t>
             </a:r>
             <a:endParaRPr lang="en-GB" dirty="0"/>
+          </a:p>
+        </p:txBody>
+      </p:sp>
+      <p:sp>
+        <p:nvSpPr>
+          <p:cNvPr id="4" name="Slide Number Placeholder 3"/>
+          <p:cNvSpPr>
+            <a:spLocks noGrp="1"/>
+          </p:cNvSpPr>
+          <p:nvPr>
+            <p:ph type="sldNum" sz="quarter" idx="12"/>
+          </p:nvPr>
+        </p:nvSpPr>
+        <p:spPr/>
+        <p:txBody>
+          <a:bodyPr/>
+          <a:lstStyle/>
+          <a:p>
+            <a:fld id="{4697367A-F411-4A3F-B2B6-75A972D0E9A9}" type="slidenum">
+              <a:rPr lang="en-GB" smtClean="0"/>
+              <a:t>8</a:t>
+            </a:fld>
+            <a:endParaRPr lang="en-GB"/>
           </a:p>
         </p:txBody>
       </p:sp>
@@ -3208,7 +4808,7 @@
 </p:sld>
 </file>
 
-<file path=ppt/slides/slide4.xml><?xml version="1.0" encoding="utf-8"?>
+<file path=ppt/slides/slide9.xml><?xml version="1.0" encoding="utf-8"?>
 <p:sld xmlns:a="http://schemas.openxmlformats.org/drawingml/2006/main" xmlns:r="http://schemas.openxmlformats.org/officeDocument/2006/relationships" xmlns:p="http://schemas.openxmlformats.org/presentationml/2006/main">
   <p:cSld>
     <p:spTree>
@@ -3291,384 +4891,33 @@
           </a:p>
         </p:txBody>
       </p:sp>
+      <p:sp>
+        <p:nvSpPr>
+          <p:cNvPr id="4" name="Slide Number Placeholder 3"/>
+          <p:cNvSpPr>
+            <a:spLocks noGrp="1"/>
+          </p:cNvSpPr>
+          <p:nvPr>
+            <p:ph type="sldNum" sz="quarter" idx="12"/>
+          </p:nvPr>
+        </p:nvSpPr>
+        <p:spPr/>
+        <p:txBody>
+          <a:bodyPr/>
+          <a:lstStyle/>
+          <a:p>
+            <a:fld id="{4697367A-F411-4A3F-B2B6-75A972D0E9A9}" type="slidenum">
+              <a:rPr lang="en-GB" smtClean="0"/>
+              <a:t>9</a:t>
+            </a:fld>
+            <a:endParaRPr lang="en-GB"/>
+          </a:p>
+        </p:txBody>
+      </p:sp>
     </p:spTree>
     <p:extLst>
       <p:ext uri="{BB962C8B-B14F-4D97-AF65-F5344CB8AC3E}">
         <p14:creationId xmlns:p14="http://schemas.microsoft.com/office/powerpoint/2010/main" val="236943104"/>
-      </p:ext>
-    </p:extLst>
-  </p:cSld>
-  <p:clrMapOvr>
-    <a:masterClrMapping/>
-  </p:clrMapOvr>
-  <p:timing>
-    <p:tnLst>
-      <p:par>
-        <p:cTn id="1" dur="indefinite" restart="never" nodeType="tmRoot"/>
-      </p:par>
-    </p:tnLst>
-  </p:timing>
-</p:sld>
-</file>
-
-<file path=ppt/slides/slide5.xml><?xml version="1.0" encoding="utf-8"?>
-<p:sld xmlns:a="http://schemas.openxmlformats.org/drawingml/2006/main" xmlns:r="http://schemas.openxmlformats.org/officeDocument/2006/relationships" xmlns:p="http://schemas.openxmlformats.org/presentationml/2006/main">
-  <p:cSld>
-    <p:spTree>
-      <p:nvGrpSpPr>
-        <p:cNvPr id="1" name=""/>
-        <p:cNvGrpSpPr/>
-        <p:nvPr/>
-      </p:nvGrpSpPr>
-      <p:grpSpPr>
-        <a:xfrm>
-          <a:off x="0" y="0"/>
-          <a:ext cx="0" cy="0"/>
-          <a:chOff x="0" y="0"/>
-          <a:chExt cx="0" cy="0"/>
-        </a:xfrm>
-      </p:grpSpPr>
-      <p:sp>
-        <p:nvSpPr>
-          <p:cNvPr id="2" name="Title 1"/>
-          <p:cNvSpPr>
-            <a:spLocks noGrp="1"/>
-          </p:cNvSpPr>
-          <p:nvPr>
-            <p:ph type="title"/>
-          </p:nvPr>
-        </p:nvSpPr>
-        <p:spPr/>
-        <p:txBody>
-          <a:bodyPr/>
-          <a:lstStyle/>
-          <a:p>
-            <a:r>
-              <a:rPr lang="en-GB" dirty="0" smtClean="0"/>
-              <a:t>Deploying Workflows</a:t>
-            </a:r>
-            <a:endParaRPr lang="en-GB" dirty="0"/>
-          </a:p>
-        </p:txBody>
-      </p:sp>
-      <p:sp>
-        <p:nvSpPr>
-          <p:cNvPr id="3" name="Content Placeholder 2"/>
-          <p:cNvSpPr>
-            <a:spLocks noGrp="1"/>
-          </p:cNvSpPr>
-          <p:nvPr>
-            <p:ph idx="1"/>
-          </p:nvPr>
-        </p:nvSpPr>
-        <p:spPr/>
-        <p:txBody>
-          <a:bodyPr/>
-          <a:lstStyle/>
-          <a:p>
-            <a:r>
-              <a:rPr lang="en-GB" dirty="0" smtClean="0"/>
-              <a:t>Use Dynamics 365 Developer Toolkit Deployment project to deploy.</a:t>
-            </a:r>
-          </a:p>
-          <a:p>
-            <a:r>
-              <a:rPr lang="en-GB" dirty="0" err="1" smtClean="0"/>
-              <a:t>RegisterFile.crmregister</a:t>
-            </a:r>
-            <a:endParaRPr lang="en-GB" dirty="0" smtClean="0"/>
-          </a:p>
-          <a:p>
-            <a:r>
-              <a:rPr lang="en-GB" dirty="0" smtClean="0"/>
-              <a:t>Ensures consistency</a:t>
-            </a:r>
-            <a:endParaRPr lang="en-GB" dirty="0"/>
-          </a:p>
-        </p:txBody>
-      </p:sp>
-    </p:spTree>
-    <p:extLst>
-      <p:ext uri="{BB962C8B-B14F-4D97-AF65-F5344CB8AC3E}">
-        <p14:creationId xmlns:p14="http://schemas.microsoft.com/office/powerpoint/2010/main" val="2978681543"/>
-      </p:ext>
-    </p:extLst>
-  </p:cSld>
-  <p:clrMapOvr>
-    <a:masterClrMapping/>
-  </p:clrMapOvr>
-  <p:timing>
-    <p:tnLst>
-      <p:par>
-        <p:cTn id="1" dur="indefinite" restart="never" nodeType="tmRoot"/>
-      </p:par>
-    </p:tnLst>
-  </p:timing>
-</p:sld>
-</file>
-
-<file path=ppt/slides/slide6.xml><?xml version="1.0" encoding="utf-8"?>
-<p:sld xmlns:a="http://schemas.openxmlformats.org/drawingml/2006/main" xmlns:r="http://schemas.openxmlformats.org/officeDocument/2006/relationships" xmlns:p="http://schemas.openxmlformats.org/presentationml/2006/main">
-  <p:cSld>
-    <p:spTree>
-      <p:nvGrpSpPr>
-        <p:cNvPr id="1" name=""/>
-        <p:cNvGrpSpPr/>
-        <p:nvPr/>
-      </p:nvGrpSpPr>
-      <p:grpSpPr>
-        <a:xfrm>
-          <a:off x="0" y="0"/>
-          <a:ext cx="0" cy="0"/>
-          <a:chOff x="0" y="0"/>
-          <a:chExt cx="0" cy="0"/>
-        </a:xfrm>
-      </p:grpSpPr>
-      <p:sp>
-        <p:nvSpPr>
-          <p:cNvPr id="2" name="Title 1"/>
-          <p:cNvSpPr>
-            <a:spLocks noGrp="1"/>
-          </p:cNvSpPr>
-          <p:nvPr>
-            <p:ph type="title"/>
-          </p:nvPr>
-        </p:nvSpPr>
-        <p:spPr/>
-        <p:txBody>
-          <a:bodyPr/>
-          <a:lstStyle/>
-          <a:p>
-            <a:r>
-              <a:rPr lang="en-GB" dirty="0" smtClean="0"/>
-              <a:t>Workflow assembly versions	</a:t>
-            </a:r>
-            <a:endParaRPr lang="en-GB" dirty="0"/>
-          </a:p>
-        </p:txBody>
-      </p:sp>
-      <p:sp>
-        <p:nvSpPr>
-          <p:cNvPr id="3" name="Content Placeholder 2"/>
-          <p:cNvSpPr>
-            <a:spLocks noGrp="1"/>
-          </p:cNvSpPr>
-          <p:nvPr>
-            <p:ph idx="1"/>
-          </p:nvPr>
-        </p:nvSpPr>
-        <p:spPr/>
-        <p:txBody>
-          <a:bodyPr>
-            <a:normAutofit fontScale="92500" lnSpcReduction="20000"/>
-          </a:bodyPr>
-          <a:lstStyle/>
-          <a:p>
-            <a:r>
-              <a:rPr lang="en-GB" dirty="0" smtClean="0"/>
-              <a:t>Be careful when changing the assembly version.</a:t>
-            </a:r>
-          </a:p>
-          <a:p>
-            <a:r>
-              <a:rPr lang="en-GB" dirty="0" smtClean="0"/>
-              <a:t>1.3.4.5</a:t>
-            </a:r>
-          </a:p>
-          <a:p>
-            <a:r>
-              <a:rPr lang="en-GB" dirty="0" err="1" smtClean="0"/>
-              <a:t>Major.minor.build.revision</a:t>
-            </a:r>
-            <a:endParaRPr lang="en-GB" dirty="0" smtClean="0"/>
-          </a:p>
-          <a:p>
-            <a:r>
-              <a:rPr lang="en-GB" dirty="0" smtClean="0"/>
-              <a:t>Update workflow – public interface unchanged.</a:t>
-            </a:r>
-          </a:p>
-          <a:p>
-            <a:r>
-              <a:rPr lang="en-GB" dirty="0" smtClean="0"/>
-              <a:t>Only change build or revision.</a:t>
-            </a:r>
-          </a:p>
-          <a:p>
-            <a:r>
-              <a:rPr lang="en-GB" dirty="0" smtClean="0"/>
-              <a:t>Existing workflows will pick up the updated assembly.</a:t>
-            </a:r>
-          </a:p>
-          <a:p>
-            <a:r>
-              <a:rPr lang="en-GB" dirty="0" smtClean="0"/>
-              <a:t>Upgrade – significant differences.</a:t>
-            </a:r>
-          </a:p>
-          <a:p>
-            <a:r>
-              <a:rPr lang="en-GB" dirty="0" smtClean="0"/>
-              <a:t>Change major or minor version.  Keep Name, Key Culture the same.</a:t>
-            </a:r>
-          </a:p>
-          <a:p>
-            <a:r>
-              <a:rPr lang="en-GB" dirty="0" smtClean="0"/>
-              <a:t>Existing Workflows keep the old version.</a:t>
-            </a:r>
-          </a:p>
-          <a:p>
-            <a:r>
-              <a:rPr lang="en-GB" dirty="0" smtClean="0"/>
-              <a:t>Should </a:t>
-            </a:r>
-            <a:endParaRPr lang="en-GB" dirty="0"/>
-          </a:p>
-        </p:txBody>
-      </p:sp>
-    </p:spTree>
-    <p:extLst>
-      <p:ext uri="{BB962C8B-B14F-4D97-AF65-F5344CB8AC3E}">
-        <p14:creationId xmlns:p14="http://schemas.microsoft.com/office/powerpoint/2010/main" val="356291784"/>
-      </p:ext>
-    </p:extLst>
-  </p:cSld>
-  <p:clrMapOvr>
-    <a:masterClrMapping/>
-  </p:clrMapOvr>
-  <p:timing>
-    <p:tnLst>
-      <p:par>
-        <p:cTn id="1" dur="indefinite" restart="never" nodeType="tmRoot"/>
-      </p:par>
-    </p:tnLst>
-  </p:timing>
-</p:sld>
-</file>
-
-<file path=ppt/slides/slide7.xml><?xml version="1.0" encoding="utf-8"?>
-<p:sld xmlns:a="http://schemas.openxmlformats.org/drawingml/2006/main" xmlns:r="http://schemas.openxmlformats.org/officeDocument/2006/relationships" xmlns:p="http://schemas.openxmlformats.org/presentationml/2006/main">
-  <p:cSld>
-    <p:spTree>
-      <p:nvGrpSpPr>
-        <p:cNvPr id="1" name=""/>
-        <p:cNvGrpSpPr/>
-        <p:nvPr/>
-      </p:nvGrpSpPr>
-      <p:grpSpPr>
-        <a:xfrm>
-          <a:off x="0" y="0"/>
-          <a:ext cx="0" cy="0"/>
-          <a:chOff x="0" y="0"/>
-          <a:chExt cx="0" cy="0"/>
-        </a:xfrm>
-      </p:grpSpPr>
-      <p:sp>
-        <p:nvSpPr>
-          <p:cNvPr id="2" name="Title 1"/>
-          <p:cNvSpPr>
-            <a:spLocks noGrp="1"/>
-          </p:cNvSpPr>
-          <p:nvPr>
-            <p:ph type="title"/>
-          </p:nvPr>
-        </p:nvSpPr>
-        <p:spPr/>
-        <p:txBody>
-          <a:bodyPr/>
-          <a:lstStyle/>
-          <a:p>
-            <a:r>
-              <a:rPr lang="en-GB" dirty="0" smtClean="0"/>
-              <a:t>Merging Assemblies	</a:t>
-            </a:r>
-            <a:endParaRPr lang="en-GB" dirty="0"/>
-          </a:p>
-        </p:txBody>
-      </p:sp>
-      <p:sp>
-        <p:nvSpPr>
-          <p:cNvPr id="3" name="Content Placeholder 2"/>
-          <p:cNvSpPr>
-            <a:spLocks noGrp="1"/>
-          </p:cNvSpPr>
-          <p:nvPr>
-            <p:ph idx="1"/>
-          </p:nvPr>
-        </p:nvSpPr>
-        <p:spPr/>
-        <p:txBody>
-          <a:bodyPr/>
-          <a:lstStyle/>
-          <a:p>
-            <a:r>
-              <a:rPr lang="en-GB" dirty="0" smtClean="0"/>
-              <a:t>Problem – your plugin/custom activity depends on 3</a:t>
-            </a:r>
-            <a:r>
-              <a:rPr lang="en-GB" baseline="30000" dirty="0" smtClean="0"/>
-              <a:t>rd</a:t>
-            </a:r>
-            <a:r>
-              <a:rPr lang="en-GB" dirty="0" smtClean="0"/>
-              <a:t> party assemblies.</a:t>
-            </a:r>
-          </a:p>
-          <a:p>
-            <a:r>
-              <a:rPr lang="en-GB" dirty="0" smtClean="0"/>
-              <a:t>How do you make these available to your plugin</a:t>
-            </a:r>
-          </a:p>
-          <a:p>
-            <a:r>
-              <a:rPr lang="en-GB" dirty="0" smtClean="0"/>
-              <a:t>Use </a:t>
-            </a:r>
-            <a:r>
-              <a:rPr lang="en-GB" dirty="0" err="1" smtClean="0"/>
-              <a:t>ilmerge</a:t>
-            </a:r>
-            <a:endParaRPr lang="en-GB" dirty="0" smtClean="0"/>
-          </a:p>
-          <a:p>
-            <a:r>
-              <a:rPr lang="en-GB" dirty="0" smtClean="0"/>
-              <a:t>Set “</a:t>
-            </a:r>
-            <a:r>
-              <a:rPr lang="en-GB" dirty="0" err="1" smtClean="0"/>
-              <a:t>CopyLocal</a:t>
-            </a:r>
-            <a:r>
-              <a:rPr lang="en-GB" dirty="0" smtClean="0"/>
-              <a:t> = false” on any </a:t>
-            </a:r>
-            <a:r>
-              <a:rPr lang="en-GB" dirty="0" err="1" smtClean="0"/>
-              <a:t>Microsoft.Xrm</a:t>
-            </a:r>
-            <a:r>
-              <a:rPr lang="en-GB" dirty="0" smtClean="0"/>
-              <a:t> </a:t>
-            </a:r>
-            <a:r>
-              <a:rPr lang="en-GB" dirty="0" err="1" smtClean="0"/>
-              <a:t>etc</a:t>
-            </a:r>
-            <a:r>
-              <a:rPr lang="en-GB" smtClean="0"/>
-              <a:t> assemblies.</a:t>
-            </a:r>
-            <a:endParaRPr lang="en-GB" dirty="0"/>
-          </a:p>
-        </p:txBody>
-      </p:sp>
-    </p:spTree>
-    <p:extLst>
-      <p:ext uri="{BB962C8B-B14F-4D97-AF65-F5344CB8AC3E}">
-        <p14:creationId xmlns:p14="http://schemas.microsoft.com/office/powerpoint/2010/main" val="1051107058"/>
       </p:ext>
     </p:extLst>
   </p:cSld>
@@ -3944,4 +5193,265 @@
     </a:ext>
   </a:extLst>
 </a:theme>
+</file>
+
+<file path=ppt/theme/theme2.xml><?xml version="1.0" encoding="utf-8"?>
+<a:theme xmlns:a="http://schemas.openxmlformats.org/drawingml/2006/main" name="Office Theme">
+  <a:themeElements>
+    <a:clrScheme name="Office">
+      <a:dk1>
+        <a:sysClr val="windowText" lastClr="000000"/>
+      </a:dk1>
+      <a:lt1>
+        <a:sysClr val="window" lastClr="FFFFFF"/>
+      </a:lt1>
+      <a:dk2>
+        <a:srgbClr val="44546A"/>
+      </a:dk2>
+      <a:lt2>
+        <a:srgbClr val="E7E6E6"/>
+      </a:lt2>
+      <a:accent1>
+        <a:srgbClr val="5B9BD5"/>
+      </a:accent1>
+      <a:accent2>
+        <a:srgbClr val="ED7D31"/>
+      </a:accent2>
+      <a:accent3>
+        <a:srgbClr val="A5A5A5"/>
+      </a:accent3>
+      <a:accent4>
+        <a:srgbClr val="FFC000"/>
+      </a:accent4>
+      <a:accent5>
+        <a:srgbClr val="4472C4"/>
+      </a:accent5>
+      <a:accent6>
+        <a:srgbClr val="70AD47"/>
+      </a:accent6>
+      <a:hlink>
+        <a:srgbClr val="0563C1"/>
+      </a:hlink>
+      <a:folHlink>
+        <a:srgbClr val="954F72"/>
+      </a:folHlink>
+    </a:clrScheme>
+    <a:fontScheme name="Office">
+      <a:majorFont>
+        <a:latin typeface="Calibri Light" panose="020F0302020204030204"/>
+        <a:ea typeface=""/>
+        <a:cs typeface=""/>
+        <a:font script="Jpan" typeface="游ゴシック Light"/>
+        <a:font script="Hang" typeface="맑은 고딕"/>
+        <a:font script="Hans" typeface="等线 Light"/>
+        <a:font script="Hant" typeface="新細明體"/>
+        <a:font script="Arab" typeface="Times New Roman"/>
+        <a:font script="Hebr" typeface="Times New Roman"/>
+        <a:font script="Thai" typeface="Angsana New"/>
+        <a:font script="Ethi" typeface="Nyala"/>
+        <a:font script="Beng" typeface="Vrinda"/>
+        <a:font script="Gujr" typeface="Shruti"/>
+        <a:font script="Khmr" typeface="MoolBoran"/>
+        <a:font script="Knda" typeface="Tunga"/>
+        <a:font script="Guru" typeface="Raavi"/>
+        <a:font script="Cans" typeface="Euphemia"/>
+        <a:font script="Cher" typeface="Plantagenet Cherokee"/>
+        <a:font script="Yiii" typeface="Microsoft Yi Baiti"/>
+        <a:font script="Tibt" typeface="Microsoft Himalaya"/>
+        <a:font script="Thaa" typeface="MV Boli"/>
+        <a:font script="Deva" typeface="Mangal"/>
+        <a:font script="Telu" typeface="Gautami"/>
+        <a:font script="Taml" typeface="Latha"/>
+        <a:font script="Syrc" typeface="Estrangelo Edessa"/>
+        <a:font script="Orya" typeface="Kalinga"/>
+        <a:font script="Mlym" typeface="Kartika"/>
+        <a:font script="Laoo" typeface="DokChampa"/>
+        <a:font script="Sinh" typeface="Iskoola Pota"/>
+        <a:font script="Mong" typeface="Mongolian Baiti"/>
+        <a:font script="Viet" typeface="Times New Roman"/>
+        <a:font script="Uigh" typeface="Microsoft Uighur"/>
+        <a:font script="Geor" typeface="Sylfaen"/>
+      </a:majorFont>
+      <a:minorFont>
+        <a:latin typeface="Calibri" panose="020F0502020204030204"/>
+        <a:ea typeface=""/>
+        <a:cs typeface=""/>
+        <a:font script="Jpan" typeface="游ゴシック"/>
+        <a:font script="Hang" typeface="맑은 고딕"/>
+        <a:font script="Hans" typeface="等线"/>
+        <a:font script="Hant" typeface="新細明體"/>
+        <a:font script="Arab" typeface="Arial"/>
+        <a:font script="Hebr" typeface="Arial"/>
+        <a:font script="Thai" typeface="Cordia New"/>
+        <a:font script="Ethi" typeface="Nyala"/>
+        <a:font script="Beng" typeface="Vrinda"/>
+        <a:font script="Gujr" typeface="Shruti"/>
+        <a:font script="Khmr" typeface="DaunPenh"/>
+        <a:font script="Knda" typeface="Tunga"/>
+        <a:font script="Guru" typeface="Raavi"/>
+        <a:font script="Cans" typeface="Euphemia"/>
+        <a:font script="Cher" typeface="Plantagenet Cherokee"/>
+        <a:font script="Yiii" typeface="Microsoft Yi Baiti"/>
+        <a:font script="Tibt" typeface="Microsoft Himalaya"/>
+        <a:font script="Thaa" typeface="MV Boli"/>
+        <a:font script="Deva" typeface="Mangal"/>
+        <a:font script="Telu" typeface="Gautami"/>
+        <a:font script="Taml" typeface="Latha"/>
+        <a:font script="Syrc" typeface="Estrangelo Edessa"/>
+        <a:font script="Orya" typeface="Kalinga"/>
+        <a:font script="Mlym" typeface="Kartika"/>
+        <a:font script="Laoo" typeface="DokChampa"/>
+        <a:font script="Sinh" typeface="Iskoola Pota"/>
+        <a:font script="Mong" typeface="Mongolian Baiti"/>
+        <a:font script="Viet" typeface="Arial"/>
+        <a:font script="Uigh" typeface="Microsoft Uighur"/>
+        <a:font script="Geor" typeface="Sylfaen"/>
+      </a:minorFont>
+    </a:fontScheme>
+    <a:fmtScheme name="Office">
+      <a:fillStyleLst>
+        <a:solidFill>
+          <a:schemeClr val="phClr"/>
+        </a:solidFill>
+        <a:gradFill rotWithShape="1">
+          <a:gsLst>
+            <a:gs pos="0">
+              <a:schemeClr val="phClr">
+                <a:lumMod val="110000"/>
+                <a:satMod val="105000"/>
+                <a:tint val="67000"/>
+              </a:schemeClr>
+            </a:gs>
+            <a:gs pos="50000">
+              <a:schemeClr val="phClr">
+                <a:lumMod val="105000"/>
+                <a:satMod val="103000"/>
+                <a:tint val="73000"/>
+              </a:schemeClr>
+            </a:gs>
+            <a:gs pos="100000">
+              <a:schemeClr val="phClr">
+                <a:lumMod val="105000"/>
+                <a:satMod val="109000"/>
+                <a:tint val="81000"/>
+              </a:schemeClr>
+            </a:gs>
+          </a:gsLst>
+          <a:lin ang="5400000" scaled="0"/>
+        </a:gradFill>
+        <a:gradFill rotWithShape="1">
+          <a:gsLst>
+            <a:gs pos="0">
+              <a:schemeClr val="phClr">
+                <a:satMod val="103000"/>
+                <a:lumMod val="102000"/>
+                <a:tint val="94000"/>
+              </a:schemeClr>
+            </a:gs>
+            <a:gs pos="50000">
+              <a:schemeClr val="phClr">
+                <a:satMod val="110000"/>
+                <a:lumMod val="100000"/>
+                <a:shade val="100000"/>
+              </a:schemeClr>
+            </a:gs>
+            <a:gs pos="100000">
+              <a:schemeClr val="phClr">
+                <a:lumMod val="99000"/>
+                <a:satMod val="120000"/>
+                <a:shade val="78000"/>
+              </a:schemeClr>
+            </a:gs>
+          </a:gsLst>
+          <a:lin ang="5400000" scaled="0"/>
+        </a:gradFill>
+      </a:fillStyleLst>
+      <a:lnStyleLst>
+        <a:ln w="6350" cap="flat" cmpd="sng" algn="ctr">
+          <a:solidFill>
+            <a:schemeClr val="phClr"/>
+          </a:solidFill>
+          <a:prstDash val="solid"/>
+          <a:miter lim="800000"/>
+        </a:ln>
+        <a:ln w="12700" cap="flat" cmpd="sng" algn="ctr">
+          <a:solidFill>
+            <a:schemeClr val="phClr"/>
+          </a:solidFill>
+          <a:prstDash val="solid"/>
+          <a:miter lim="800000"/>
+        </a:ln>
+        <a:ln w="19050" cap="flat" cmpd="sng" algn="ctr">
+          <a:solidFill>
+            <a:schemeClr val="phClr"/>
+          </a:solidFill>
+          <a:prstDash val="solid"/>
+          <a:miter lim="800000"/>
+        </a:ln>
+      </a:lnStyleLst>
+      <a:effectStyleLst>
+        <a:effectStyle>
+          <a:effectLst/>
+        </a:effectStyle>
+        <a:effectStyle>
+          <a:effectLst/>
+        </a:effectStyle>
+        <a:effectStyle>
+          <a:effectLst>
+            <a:outerShdw blurRad="57150" dist="19050" dir="5400000" algn="ctr" rotWithShape="0">
+              <a:srgbClr val="000000">
+                <a:alpha val="63000"/>
+              </a:srgbClr>
+            </a:outerShdw>
+          </a:effectLst>
+        </a:effectStyle>
+      </a:effectStyleLst>
+      <a:bgFillStyleLst>
+        <a:solidFill>
+          <a:schemeClr val="phClr"/>
+        </a:solidFill>
+        <a:solidFill>
+          <a:schemeClr val="phClr">
+            <a:tint val="95000"/>
+            <a:satMod val="170000"/>
+          </a:schemeClr>
+        </a:solidFill>
+        <a:gradFill rotWithShape="1">
+          <a:gsLst>
+            <a:gs pos="0">
+              <a:schemeClr val="phClr">
+                <a:tint val="93000"/>
+                <a:satMod val="150000"/>
+                <a:shade val="98000"/>
+                <a:lumMod val="102000"/>
+              </a:schemeClr>
+            </a:gs>
+            <a:gs pos="50000">
+              <a:schemeClr val="phClr">
+                <a:tint val="98000"/>
+                <a:satMod val="130000"/>
+                <a:shade val="90000"/>
+                <a:lumMod val="103000"/>
+              </a:schemeClr>
+            </a:gs>
+            <a:gs pos="100000">
+              <a:schemeClr val="phClr">
+                <a:shade val="63000"/>
+                <a:satMod val="120000"/>
+              </a:schemeClr>
+            </a:gs>
+          </a:gsLst>
+          <a:lin ang="5400000" scaled="0"/>
+        </a:gradFill>
+      </a:bgFillStyleLst>
+    </a:fmtScheme>
+  </a:themeElements>
+  <a:objectDefaults/>
+  <a:extraClrSchemeLst/>
+  <a:extLst>
+    <a:ext uri="{05A4C25C-085E-4340-85A3-A5531E510DB2}">
+      <thm15:themeFamily xmlns:thm15="http://schemas.microsoft.com/office/thememl/2012/main" name="Office Theme" id="{62F939B6-93AF-4DB8-9C6B-D6C7DFDC589F}" vid="{4A3C46E8-61CC-4603-A589-7422A47A8E4A}"/>
+    </a:ext>
+  </a:extLst>
+</a:theme>
 </file>
</xml_diff>